<commit_message>
modif diapo + v6
</commit_message>
<xml_diff>
--- a/seoul_bike_diapo.pptx
+++ b/seoul_bike_diapo.pptx
@@ -120,6 +120,14 @@
       </a:defRPr>
     </a:lvl9pPr>
   </p:defaultTextStyle>
+  <p:extLst>
+    <p:ext uri="{EFAFB233-063F-42B5-8137-9DF3F51BA10A}">
+      <p15:sldGuideLst xmlns:p15="http://schemas.microsoft.com/office/powerpoint/2012/main"/>
+    </p:ext>
+    <p:ext uri="{2D200454-40CA-4A62-9FC3-DE9A4176ACB9}">
+      <p15:notesGuideLst xmlns:p15="http://schemas.microsoft.com/office/powerpoint/2012/main"/>
+    </p:ext>
+  </p:extLst>
 </p:presentation>
 </file>
 
@@ -150,7 +158,7 @@
           <p:cNvPr id="2" name="Espace réservé de l'en-tête 1">
             <a:extLst>
               <a:ext uri="{FF2B5EF4-FFF2-40B4-BE49-F238E27FC236}">
-                <a16:creationId xmlns:a16="http://schemas.microsoft.com/office/drawing/2014/main" id="{9EC4ABF5-15FA-4632-8805-BF1A46C37423}"/>
+                <a16:creationId xmlns:a16="http://schemas.microsoft.com/office/drawing/2014/main" xmlns="" id="{9EC4ABF5-15FA-4632-8805-BF1A46C37423}"/>
               </a:ext>
             </a:extLst>
           </p:cNvPr>
@@ -187,7 +195,7 @@
           <p:cNvPr id="3" name="Espace réservé de la date 2">
             <a:extLst>
               <a:ext uri="{FF2B5EF4-FFF2-40B4-BE49-F238E27FC236}">
-                <a16:creationId xmlns:a16="http://schemas.microsoft.com/office/drawing/2014/main" id="{1F7396C5-8DEA-406F-A0E8-2187C1329007}"/>
+                <a16:creationId xmlns:a16="http://schemas.microsoft.com/office/drawing/2014/main" xmlns="" id="{1F7396C5-8DEA-406F-A0E8-2187C1329007}"/>
               </a:ext>
             </a:extLst>
           </p:cNvPr>
@@ -217,7 +225,7 @@
           <a:p>
             <a:fld id="{DAFE6A69-6954-442F-95F0-1750C541F79A}" type="datetimeFigureOut">
               <a:rPr lang="es-ES" smtClean="0"/>
-              <a:t>01/01/2022</a:t>
+              <a:t>02/01/2022</a:t>
             </a:fld>
             <a:endParaRPr lang="es-ES"/>
           </a:p>
@@ -228,7 +236,7 @@
           <p:cNvPr id="4" name="Espace réservé du pied de page 3">
             <a:extLst>
               <a:ext uri="{FF2B5EF4-FFF2-40B4-BE49-F238E27FC236}">
-                <a16:creationId xmlns:a16="http://schemas.microsoft.com/office/drawing/2014/main" id="{86E5B3AD-C682-456E-9138-0448F813764F}"/>
+                <a16:creationId xmlns:a16="http://schemas.microsoft.com/office/drawing/2014/main" xmlns="" id="{86E5B3AD-C682-456E-9138-0448F813764F}"/>
               </a:ext>
             </a:extLst>
           </p:cNvPr>
@@ -268,7 +276,7 @@
           <p:cNvPr id="5" name="Espace réservé du numéro de diapositive 4">
             <a:extLst>
               <a:ext uri="{FF2B5EF4-FFF2-40B4-BE49-F238E27FC236}">
-                <a16:creationId xmlns:a16="http://schemas.microsoft.com/office/drawing/2014/main" id="{C54FEC12-2F39-4580-ABC8-9859E50C885B}"/>
+                <a16:creationId xmlns:a16="http://schemas.microsoft.com/office/drawing/2014/main" xmlns="" id="{C54FEC12-2F39-4580-ABC8-9859E50C885B}"/>
               </a:ext>
             </a:extLst>
           </p:cNvPr>
@@ -398,7 +406,7 @@
           <a:p>
             <a:fld id="{582D680B-73F4-4CB8-90FB-DD7EB4DD57B2}" type="datetimeFigureOut">
               <a:rPr lang="es-ES" smtClean="0"/>
-              <a:t>01/01/2022</a:t>
+              <a:t>02/01/2022</a:t>
             </a:fld>
             <a:endParaRPr lang="es-ES"/>
           </a:p>
@@ -692,7 +700,7 @@
           <p:cNvPr id="2" name="Title 1">
             <a:extLst>
               <a:ext uri="{FF2B5EF4-FFF2-40B4-BE49-F238E27FC236}">
-                <a16:creationId xmlns:a16="http://schemas.microsoft.com/office/drawing/2014/main" id="{8DA57C3F-0FB2-4B2E-BA6A-FEEEFF1AF7E3}"/>
+                <a16:creationId xmlns:a16="http://schemas.microsoft.com/office/drawing/2014/main" xmlns="" id="{8DA57C3F-0FB2-4B2E-BA6A-FEEEFF1AF7E3}"/>
               </a:ext>
             </a:extLst>
           </p:cNvPr>
@@ -732,7 +740,7 @@
           <p:cNvPr id="3" name="Subtitle 2">
             <a:extLst>
               <a:ext uri="{FF2B5EF4-FFF2-40B4-BE49-F238E27FC236}">
-                <a16:creationId xmlns:a16="http://schemas.microsoft.com/office/drawing/2014/main" id="{08583AE9-1CC1-4572-A6E5-E97F80E47661}"/>
+                <a16:creationId xmlns:a16="http://schemas.microsoft.com/office/drawing/2014/main" xmlns="" id="{08583AE9-1CC1-4572-A6E5-E97F80E47661}"/>
               </a:ext>
             </a:extLst>
           </p:cNvPr>
@@ -803,7 +811,7 @@
           <p:cNvPr id="4" name="Date Placeholder 3">
             <a:extLst>
               <a:ext uri="{FF2B5EF4-FFF2-40B4-BE49-F238E27FC236}">
-                <a16:creationId xmlns:a16="http://schemas.microsoft.com/office/drawing/2014/main" id="{9C04DE7C-68AB-403D-B9D8-7398C292C6DA}"/>
+                <a16:creationId xmlns:a16="http://schemas.microsoft.com/office/drawing/2014/main" xmlns="" id="{9C04DE7C-68AB-403D-B9D8-7398C292C6DA}"/>
               </a:ext>
             </a:extLst>
           </p:cNvPr>
@@ -821,7 +829,7 @@
           <a:p>
             <a:fld id="{23FEA57E-7C1A-457B-A4CD-5DCEB057B502}" type="datetime1">
               <a:rPr lang="en-US" smtClean="0"/>
-              <a:t>1/1/2022</a:t>
+              <a:t>1/2/2022</a:t>
             </a:fld>
             <a:endParaRPr lang="en-US" dirty="0"/>
           </a:p>
@@ -832,7 +840,7 @@
           <p:cNvPr id="5" name="Footer Placeholder 4">
             <a:extLst>
               <a:ext uri="{FF2B5EF4-FFF2-40B4-BE49-F238E27FC236}">
-                <a16:creationId xmlns:a16="http://schemas.microsoft.com/office/drawing/2014/main" id="{51003E50-6613-4D86-AA22-43B14E7279E9}"/>
+                <a16:creationId xmlns:a16="http://schemas.microsoft.com/office/drawing/2014/main" xmlns="" id="{51003E50-6613-4D86-AA22-43B14E7279E9}"/>
               </a:ext>
             </a:extLst>
           </p:cNvPr>
@@ -860,7 +868,7 @@
           <p:cNvPr id="6" name="Slide Number Placeholder 5">
             <a:extLst>
               <a:ext uri="{FF2B5EF4-FFF2-40B4-BE49-F238E27FC236}">
-                <a16:creationId xmlns:a16="http://schemas.microsoft.com/office/drawing/2014/main" id="{03069AB5-A56D-471F-9236-EFA981E2EA03}"/>
+                <a16:creationId xmlns:a16="http://schemas.microsoft.com/office/drawing/2014/main" xmlns="" id="{03069AB5-A56D-471F-9236-EFA981E2EA03}"/>
               </a:ext>
             </a:extLst>
           </p:cNvPr>
@@ -919,7 +927,7 @@
           <p:cNvPr id="2" name="Title 1">
             <a:extLst>
               <a:ext uri="{FF2B5EF4-FFF2-40B4-BE49-F238E27FC236}">
-                <a16:creationId xmlns:a16="http://schemas.microsoft.com/office/drawing/2014/main" id="{A402744C-12E6-455B-B646-2EA92DE0E9A2}"/>
+                <a16:creationId xmlns:a16="http://schemas.microsoft.com/office/drawing/2014/main" xmlns="" id="{A402744C-12E6-455B-B646-2EA92DE0E9A2}"/>
               </a:ext>
             </a:extLst>
           </p:cNvPr>
@@ -948,7 +956,7 @@
           <p:cNvPr id="3" name="Vertical Text Placeholder 2">
             <a:extLst>
               <a:ext uri="{FF2B5EF4-FFF2-40B4-BE49-F238E27FC236}">
-                <a16:creationId xmlns:a16="http://schemas.microsoft.com/office/drawing/2014/main" id="{B7D71C4D-C062-4EEE-9A9A-31ADCC5C8767}"/>
+                <a16:creationId xmlns:a16="http://schemas.microsoft.com/office/drawing/2014/main" xmlns="" id="{B7D71C4D-C062-4EEE-9A9A-31ADCC5C8767}"/>
               </a:ext>
             </a:extLst>
           </p:cNvPr>
@@ -1006,7 +1014,7 @@
           <p:cNvPr id="4" name="Date Placeholder 3">
             <a:extLst>
               <a:ext uri="{FF2B5EF4-FFF2-40B4-BE49-F238E27FC236}">
-                <a16:creationId xmlns:a16="http://schemas.microsoft.com/office/drawing/2014/main" id="{1944DC97-C26E-407A-9E29-68C52D547BDA}"/>
+                <a16:creationId xmlns:a16="http://schemas.microsoft.com/office/drawing/2014/main" xmlns="" id="{1944DC97-C26E-407A-9E29-68C52D547BDA}"/>
               </a:ext>
             </a:extLst>
           </p:cNvPr>
@@ -1024,7 +1032,7 @@
           <a:p>
             <a:fld id="{11789749-A4CD-447F-8298-2B7988C91CEA}" type="datetime1">
               <a:rPr lang="en-US" smtClean="0"/>
-              <a:t>1/1/2022</a:t>
+              <a:t>1/2/2022</a:t>
             </a:fld>
             <a:endParaRPr lang="en-US"/>
           </a:p>
@@ -1035,7 +1043,7 @@
           <p:cNvPr id="5" name="Footer Placeholder 4">
             <a:extLst>
               <a:ext uri="{FF2B5EF4-FFF2-40B4-BE49-F238E27FC236}">
-                <a16:creationId xmlns:a16="http://schemas.microsoft.com/office/drawing/2014/main" id="{E72E9353-B771-47FF-975E-72337414E0ED}"/>
+                <a16:creationId xmlns:a16="http://schemas.microsoft.com/office/drawing/2014/main" xmlns="" id="{E72E9353-B771-47FF-975E-72337414E0ED}"/>
               </a:ext>
             </a:extLst>
           </p:cNvPr>
@@ -1063,7 +1071,7 @@
           <p:cNvPr id="6" name="Slide Number Placeholder 5">
             <a:extLst>
               <a:ext uri="{FF2B5EF4-FFF2-40B4-BE49-F238E27FC236}">
-                <a16:creationId xmlns:a16="http://schemas.microsoft.com/office/drawing/2014/main" id="{1EA5A858-B8B2-4364-A7D0-B2E8FAE0ADD4}"/>
+                <a16:creationId xmlns:a16="http://schemas.microsoft.com/office/drawing/2014/main" xmlns="" id="{1EA5A858-B8B2-4364-A7D0-B2E8FAE0ADD4}"/>
               </a:ext>
             </a:extLst>
           </p:cNvPr>
@@ -1122,7 +1130,7 @@
           <p:cNvPr id="2" name="Vertical Title 1">
             <a:extLst>
               <a:ext uri="{FF2B5EF4-FFF2-40B4-BE49-F238E27FC236}">
-                <a16:creationId xmlns:a16="http://schemas.microsoft.com/office/drawing/2014/main" id="{42A6BABE-D80C-4F54-A03C-E1F9EBCA8323}"/>
+                <a16:creationId xmlns:a16="http://schemas.microsoft.com/office/drawing/2014/main" xmlns="" id="{42A6BABE-D80C-4F54-A03C-E1F9EBCA8323}"/>
               </a:ext>
             </a:extLst>
           </p:cNvPr>
@@ -1155,7 +1163,7 @@
           <p:cNvPr id="3" name="Vertical Text Placeholder 2">
             <a:extLst>
               <a:ext uri="{FF2B5EF4-FFF2-40B4-BE49-F238E27FC236}">
-                <a16:creationId xmlns:a16="http://schemas.microsoft.com/office/drawing/2014/main" id="{69285191-EF5B-48BE-AB5D-B7BA4C3D093D}"/>
+                <a16:creationId xmlns:a16="http://schemas.microsoft.com/office/drawing/2014/main" xmlns="" id="{69285191-EF5B-48BE-AB5D-B7BA4C3D093D}"/>
               </a:ext>
             </a:extLst>
           </p:cNvPr>
@@ -1217,7 +1225,7 @@
           <p:cNvPr id="4" name="Date Placeholder 3">
             <a:extLst>
               <a:ext uri="{FF2B5EF4-FFF2-40B4-BE49-F238E27FC236}">
-                <a16:creationId xmlns:a16="http://schemas.microsoft.com/office/drawing/2014/main" id="{19FA387A-1231-4FE3-8574-D4331A3432D2}"/>
+                <a16:creationId xmlns:a16="http://schemas.microsoft.com/office/drawing/2014/main" xmlns="" id="{19FA387A-1231-4FE3-8574-D4331A3432D2}"/>
               </a:ext>
             </a:extLst>
           </p:cNvPr>
@@ -1235,7 +1243,7 @@
           <a:p>
             <a:fld id="{BA0444D3-C0BA-4587-A56C-581AB9F841BE}" type="datetime1">
               <a:rPr lang="en-US" smtClean="0"/>
-              <a:t>1/1/2022</a:t>
+              <a:t>1/2/2022</a:t>
             </a:fld>
             <a:endParaRPr lang="en-US"/>
           </a:p>
@@ -1246,7 +1254,7 @@
           <p:cNvPr id="5" name="Footer Placeholder 4">
             <a:extLst>
               <a:ext uri="{FF2B5EF4-FFF2-40B4-BE49-F238E27FC236}">
-                <a16:creationId xmlns:a16="http://schemas.microsoft.com/office/drawing/2014/main" id="{02F21559-4901-4AD3-ABE7-DF0235457312}"/>
+                <a16:creationId xmlns:a16="http://schemas.microsoft.com/office/drawing/2014/main" xmlns="" id="{02F21559-4901-4AD3-ABE7-DF0235457312}"/>
               </a:ext>
             </a:extLst>
           </p:cNvPr>
@@ -1274,7 +1282,7 @@
           <p:cNvPr id="6" name="Slide Number Placeholder 5">
             <a:extLst>
               <a:ext uri="{FF2B5EF4-FFF2-40B4-BE49-F238E27FC236}">
-                <a16:creationId xmlns:a16="http://schemas.microsoft.com/office/drawing/2014/main" id="{D8F6C18E-B751-4E7B-9CD8-1BF44DAB80F4}"/>
+                <a16:creationId xmlns:a16="http://schemas.microsoft.com/office/drawing/2014/main" xmlns="" id="{D8F6C18E-B751-4E7B-9CD8-1BF44DAB80F4}"/>
               </a:ext>
             </a:extLst>
           </p:cNvPr>
@@ -1333,7 +1341,7 @@
           <p:cNvPr id="2" name="Title 1">
             <a:extLst>
               <a:ext uri="{FF2B5EF4-FFF2-40B4-BE49-F238E27FC236}">
-                <a16:creationId xmlns:a16="http://schemas.microsoft.com/office/drawing/2014/main" id="{FA49B412-EBAB-4569-B3D9-6B346BF837B2}"/>
+                <a16:creationId xmlns:a16="http://schemas.microsoft.com/office/drawing/2014/main" xmlns="" id="{FA49B412-EBAB-4569-B3D9-6B346BF837B2}"/>
               </a:ext>
             </a:extLst>
           </p:cNvPr>
@@ -1373,7 +1381,7 @@
           <p:cNvPr id="3" name="Content Placeholder 2">
             <a:extLst>
               <a:ext uri="{FF2B5EF4-FFF2-40B4-BE49-F238E27FC236}">
-                <a16:creationId xmlns:a16="http://schemas.microsoft.com/office/drawing/2014/main" id="{95E7C8AE-B0F4-404F-BCAD-A14C18E50D99}"/>
+                <a16:creationId xmlns:a16="http://schemas.microsoft.com/office/drawing/2014/main" xmlns="" id="{95E7C8AE-B0F4-404F-BCAD-A14C18E50D99}"/>
               </a:ext>
             </a:extLst>
           </p:cNvPr>
@@ -1431,7 +1439,7 @@
           <p:cNvPr id="4" name="Date Placeholder 3">
             <a:extLst>
               <a:ext uri="{FF2B5EF4-FFF2-40B4-BE49-F238E27FC236}">
-                <a16:creationId xmlns:a16="http://schemas.microsoft.com/office/drawing/2014/main" id="{B8AA9CAD-DAFB-4DE3-9C41-7FD03EA8D8DD}"/>
+                <a16:creationId xmlns:a16="http://schemas.microsoft.com/office/drawing/2014/main" xmlns="" id="{B8AA9CAD-DAFB-4DE3-9C41-7FD03EA8D8DD}"/>
               </a:ext>
             </a:extLst>
           </p:cNvPr>
@@ -1449,7 +1457,7 @@
           <a:p>
             <a:fld id="{201AF2CE-4F37-411C-A3EE-BBBE223265BF}" type="datetime1">
               <a:rPr lang="en-US" smtClean="0"/>
-              <a:t>1/1/2022</a:t>
+              <a:t>1/2/2022</a:t>
             </a:fld>
             <a:endParaRPr lang="en-US"/>
           </a:p>
@@ -1460,7 +1468,7 @@
           <p:cNvPr id="5" name="Footer Placeholder 4">
             <a:extLst>
               <a:ext uri="{FF2B5EF4-FFF2-40B4-BE49-F238E27FC236}">
-                <a16:creationId xmlns:a16="http://schemas.microsoft.com/office/drawing/2014/main" id="{8FCE3137-8136-46C5-AC2F-49E5F55E4C73}"/>
+                <a16:creationId xmlns:a16="http://schemas.microsoft.com/office/drawing/2014/main" xmlns="" id="{8FCE3137-8136-46C5-AC2F-49E5F55E4C73}"/>
               </a:ext>
             </a:extLst>
           </p:cNvPr>
@@ -1488,7 +1496,7 @@
           <p:cNvPr id="6" name="Slide Number Placeholder 5">
             <a:extLst>
               <a:ext uri="{FF2B5EF4-FFF2-40B4-BE49-F238E27FC236}">
-                <a16:creationId xmlns:a16="http://schemas.microsoft.com/office/drawing/2014/main" id="{AF1AB6EF-A0B1-4706-AE44-253A6B182D48}"/>
+                <a16:creationId xmlns:a16="http://schemas.microsoft.com/office/drawing/2014/main" xmlns="" id="{AF1AB6EF-A0B1-4706-AE44-253A6B182D48}"/>
               </a:ext>
             </a:extLst>
           </p:cNvPr>
@@ -1547,7 +1555,7 @@
           <p:cNvPr id="2" name="Title 1">
             <a:extLst>
               <a:ext uri="{FF2B5EF4-FFF2-40B4-BE49-F238E27FC236}">
-                <a16:creationId xmlns:a16="http://schemas.microsoft.com/office/drawing/2014/main" id="{44C02F68-BF19-468D-B422-54B6D189FA58}"/>
+                <a16:creationId xmlns:a16="http://schemas.microsoft.com/office/drawing/2014/main" xmlns="" id="{44C02F68-BF19-468D-B422-54B6D189FA58}"/>
               </a:ext>
             </a:extLst>
           </p:cNvPr>
@@ -1587,7 +1595,7 @@
           <p:cNvPr id="3" name="Text Placeholder 2">
             <a:extLst>
               <a:ext uri="{FF2B5EF4-FFF2-40B4-BE49-F238E27FC236}">
-                <a16:creationId xmlns:a16="http://schemas.microsoft.com/office/drawing/2014/main" id="{7BCBF7D7-84D4-4A39-B44E-9B029EEB1FE8}"/>
+                <a16:creationId xmlns:a16="http://schemas.microsoft.com/office/drawing/2014/main" xmlns="" id="{7BCBF7D7-84D4-4A39-B44E-9B029EEB1FE8}"/>
               </a:ext>
             </a:extLst>
           </p:cNvPr>
@@ -1712,7 +1720,7 @@
           <p:cNvPr id="4" name="Date Placeholder 3">
             <a:extLst>
               <a:ext uri="{FF2B5EF4-FFF2-40B4-BE49-F238E27FC236}">
-                <a16:creationId xmlns:a16="http://schemas.microsoft.com/office/drawing/2014/main" id="{89E29709-D243-41E8-89FA-62FA7AEB52E1}"/>
+                <a16:creationId xmlns:a16="http://schemas.microsoft.com/office/drawing/2014/main" xmlns="" id="{89E29709-D243-41E8-89FA-62FA7AEB52E1}"/>
               </a:ext>
             </a:extLst>
           </p:cNvPr>
@@ -1730,7 +1738,7 @@
           <a:p>
             <a:fld id="{C96083D4-708C-4BB5-B4FD-30CE9FA12FD5}" type="datetime1">
               <a:rPr lang="en-US" smtClean="0"/>
-              <a:t>1/1/2022</a:t>
+              <a:t>1/2/2022</a:t>
             </a:fld>
             <a:endParaRPr lang="en-US"/>
           </a:p>
@@ -1741,7 +1749,7 @@
           <p:cNvPr id="5" name="Footer Placeholder 4">
             <a:extLst>
               <a:ext uri="{FF2B5EF4-FFF2-40B4-BE49-F238E27FC236}">
-                <a16:creationId xmlns:a16="http://schemas.microsoft.com/office/drawing/2014/main" id="{5AAB99C0-DC2A-4133-A10D-D43A1E05BB1A}"/>
+                <a16:creationId xmlns:a16="http://schemas.microsoft.com/office/drawing/2014/main" xmlns="" id="{5AAB99C0-DC2A-4133-A10D-D43A1E05BB1A}"/>
               </a:ext>
             </a:extLst>
           </p:cNvPr>
@@ -1769,7 +1777,7 @@
           <p:cNvPr id="6" name="Slide Number Placeholder 5">
             <a:extLst>
               <a:ext uri="{FF2B5EF4-FFF2-40B4-BE49-F238E27FC236}">
-                <a16:creationId xmlns:a16="http://schemas.microsoft.com/office/drawing/2014/main" id="{98122EFD-A17E-47F5-8AC9-EFD6D813DBE7}"/>
+                <a16:creationId xmlns:a16="http://schemas.microsoft.com/office/drawing/2014/main" xmlns="" id="{98122EFD-A17E-47F5-8AC9-EFD6D813DBE7}"/>
               </a:ext>
             </a:extLst>
           </p:cNvPr>
@@ -1828,7 +1836,7 @@
           <p:cNvPr id="2" name="Title 1">
             <a:extLst>
               <a:ext uri="{FF2B5EF4-FFF2-40B4-BE49-F238E27FC236}">
-                <a16:creationId xmlns:a16="http://schemas.microsoft.com/office/drawing/2014/main" id="{5E1C668D-BFBE-4765-A294-8303931B57C9}"/>
+                <a16:creationId xmlns:a16="http://schemas.microsoft.com/office/drawing/2014/main" xmlns="" id="{5E1C668D-BFBE-4765-A294-8303931B57C9}"/>
               </a:ext>
             </a:extLst>
           </p:cNvPr>
@@ -1866,7 +1874,7 @@
           <p:cNvPr id="3" name="Content Placeholder 2">
             <a:extLst>
               <a:ext uri="{FF2B5EF4-FFF2-40B4-BE49-F238E27FC236}">
-                <a16:creationId xmlns:a16="http://schemas.microsoft.com/office/drawing/2014/main" id="{61B3C212-F55F-4D0D-BFA7-F00A33CAA196}"/>
+                <a16:creationId xmlns:a16="http://schemas.microsoft.com/office/drawing/2014/main" xmlns="" id="{61B3C212-F55F-4D0D-BFA7-F00A33CAA196}"/>
               </a:ext>
             </a:extLst>
           </p:cNvPr>
@@ -1929,7 +1937,7 @@
           <p:cNvPr id="4" name="Content Placeholder 3">
             <a:extLst>
               <a:ext uri="{FF2B5EF4-FFF2-40B4-BE49-F238E27FC236}">
-                <a16:creationId xmlns:a16="http://schemas.microsoft.com/office/drawing/2014/main" id="{7154BDD7-2575-4E82-887D-DCAF9EB15924}"/>
+                <a16:creationId xmlns:a16="http://schemas.microsoft.com/office/drawing/2014/main" xmlns="" id="{7154BDD7-2575-4E82-887D-DCAF9EB15924}"/>
               </a:ext>
             </a:extLst>
           </p:cNvPr>
@@ -1992,7 +2000,7 @@
           <p:cNvPr id="5" name="Date Placeholder 4">
             <a:extLst>
               <a:ext uri="{FF2B5EF4-FFF2-40B4-BE49-F238E27FC236}">
-                <a16:creationId xmlns:a16="http://schemas.microsoft.com/office/drawing/2014/main" id="{89CAECC8-3C3A-4A5D-AB7A-1F99E5023D3F}"/>
+                <a16:creationId xmlns:a16="http://schemas.microsoft.com/office/drawing/2014/main" xmlns="" id="{89CAECC8-3C3A-4A5D-AB7A-1F99E5023D3F}"/>
               </a:ext>
             </a:extLst>
           </p:cNvPr>
@@ -2010,7 +2018,7 @@
           <a:p>
             <a:fld id="{D0D239B2-65BC-4C2A-A62B-3EABFE9590E4}" type="datetime1">
               <a:rPr lang="en-US" smtClean="0"/>
-              <a:t>1/1/2022</a:t>
+              <a:t>1/2/2022</a:t>
             </a:fld>
             <a:endParaRPr lang="en-US"/>
           </a:p>
@@ -2021,7 +2029,7 @@
           <p:cNvPr id="6" name="Footer Placeholder 5">
             <a:extLst>
               <a:ext uri="{FF2B5EF4-FFF2-40B4-BE49-F238E27FC236}">
-                <a16:creationId xmlns:a16="http://schemas.microsoft.com/office/drawing/2014/main" id="{4447609B-ACA4-4323-9340-C7DB166D7A50}"/>
+                <a16:creationId xmlns:a16="http://schemas.microsoft.com/office/drawing/2014/main" xmlns="" id="{4447609B-ACA4-4323-9340-C7DB166D7A50}"/>
               </a:ext>
             </a:extLst>
           </p:cNvPr>
@@ -2049,7 +2057,7 @@
           <p:cNvPr id="7" name="Slide Number Placeholder 6">
             <a:extLst>
               <a:ext uri="{FF2B5EF4-FFF2-40B4-BE49-F238E27FC236}">
-                <a16:creationId xmlns:a16="http://schemas.microsoft.com/office/drawing/2014/main" id="{77409EA3-C5C7-4AC6-956A-DB9A3B4F3142}"/>
+                <a16:creationId xmlns:a16="http://schemas.microsoft.com/office/drawing/2014/main" xmlns="" id="{77409EA3-C5C7-4AC6-956A-DB9A3B4F3142}"/>
               </a:ext>
             </a:extLst>
           </p:cNvPr>
@@ -2108,7 +2116,7 @@
           <p:cNvPr id="2" name="Title 1">
             <a:extLst>
               <a:ext uri="{FF2B5EF4-FFF2-40B4-BE49-F238E27FC236}">
-                <a16:creationId xmlns:a16="http://schemas.microsoft.com/office/drawing/2014/main" id="{BAE0CDE0-7431-4F05-AA47-F10EB46C9608}"/>
+                <a16:creationId xmlns:a16="http://schemas.microsoft.com/office/drawing/2014/main" xmlns="" id="{BAE0CDE0-7431-4F05-AA47-F10EB46C9608}"/>
               </a:ext>
             </a:extLst>
           </p:cNvPr>
@@ -2148,7 +2156,7 @@
           <p:cNvPr id="3" name="Text Placeholder 2">
             <a:extLst>
               <a:ext uri="{FF2B5EF4-FFF2-40B4-BE49-F238E27FC236}">
-                <a16:creationId xmlns:a16="http://schemas.microsoft.com/office/drawing/2014/main" id="{06D9FFA7-D3EA-4CB8-A471-94235AD62592}"/>
+                <a16:creationId xmlns:a16="http://schemas.microsoft.com/office/drawing/2014/main" xmlns="" id="{06D9FFA7-D3EA-4CB8-A471-94235AD62592}"/>
               </a:ext>
             </a:extLst>
           </p:cNvPr>
@@ -2219,7 +2227,7 @@
           <p:cNvPr id="4" name="Content Placeholder 3">
             <a:extLst>
               <a:ext uri="{FF2B5EF4-FFF2-40B4-BE49-F238E27FC236}">
-                <a16:creationId xmlns:a16="http://schemas.microsoft.com/office/drawing/2014/main" id="{F05360D2-88E8-43C8-92D1-67AB23BBE268}"/>
+                <a16:creationId xmlns:a16="http://schemas.microsoft.com/office/drawing/2014/main" xmlns="" id="{F05360D2-88E8-43C8-92D1-67AB23BBE268}"/>
               </a:ext>
             </a:extLst>
           </p:cNvPr>
@@ -2281,7 +2289,7 @@
           <p:cNvPr id="5" name="Text Placeholder 4">
             <a:extLst>
               <a:ext uri="{FF2B5EF4-FFF2-40B4-BE49-F238E27FC236}">
-                <a16:creationId xmlns:a16="http://schemas.microsoft.com/office/drawing/2014/main" id="{65C768F6-20A1-47A1-90FE-903135EEFD59}"/>
+                <a16:creationId xmlns:a16="http://schemas.microsoft.com/office/drawing/2014/main" xmlns="" id="{65C768F6-20A1-47A1-90FE-903135EEFD59}"/>
               </a:ext>
             </a:extLst>
           </p:cNvPr>
@@ -2352,7 +2360,7 @@
           <p:cNvPr id="6" name="Content Placeholder 5">
             <a:extLst>
               <a:ext uri="{FF2B5EF4-FFF2-40B4-BE49-F238E27FC236}">
-                <a16:creationId xmlns:a16="http://schemas.microsoft.com/office/drawing/2014/main" id="{AD555EC1-268F-4324-A003-3608AA0D847E}"/>
+                <a16:creationId xmlns:a16="http://schemas.microsoft.com/office/drawing/2014/main" xmlns="" id="{AD555EC1-268F-4324-A003-3608AA0D847E}"/>
               </a:ext>
             </a:extLst>
           </p:cNvPr>
@@ -2414,7 +2422,7 @@
           <p:cNvPr id="7" name="Date Placeholder 6">
             <a:extLst>
               <a:ext uri="{FF2B5EF4-FFF2-40B4-BE49-F238E27FC236}">
-                <a16:creationId xmlns:a16="http://schemas.microsoft.com/office/drawing/2014/main" id="{9C55C8E4-FCB8-4E06-9C43-0ACD949A73D4}"/>
+                <a16:creationId xmlns:a16="http://schemas.microsoft.com/office/drawing/2014/main" xmlns="" id="{9C55C8E4-FCB8-4E06-9C43-0ACD949A73D4}"/>
               </a:ext>
             </a:extLst>
           </p:cNvPr>
@@ -2432,7 +2440,7 @@
           <a:p>
             <a:fld id="{85E05F5A-E4A3-476F-A89E-C2B73F2431E4}" type="datetime1">
               <a:rPr lang="en-US" smtClean="0"/>
-              <a:t>1/1/2022</a:t>
+              <a:t>1/2/2022</a:t>
             </a:fld>
             <a:endParaRPr lang="en-US"/>
           </a:p>
@@ -2443,7 +2451,7 @@
           <p:cNvPr id="8" name="Footer Placeholder 7">
             <a:extLst>
               <a:ext uri="{FF2B5EF4-FFF2-40B4-BE49-F238E27FC236}">
-                <a16:creationId xmlns:a16="http://schemas.microsoft.com/office/drawing/2014/main" id="{8B01C005-C973-4D82-942A-334F1D431A04}"/>
+                <a16:creationId xmlns:a16="http://schemas.microsoft.com/office/drawing/2014/main" xmlns="" id="{8B01C005-C973-4D82-942A-334F1D431A04}"/>
               </a:ext>
             </a:extLst>
           </p:cNvPr>
@@ -2471,7 +2479,7 @@
           <p:cNvPr id="9" name="Slide Number Placeholder 8">
             <a:extLst>
               <a:ext uri="{FF2B5EF4-FFF2-40B4-BE49-F238E27FC236}">
-                <a16:creationId xmlns:a16="http://schemas.microsoft.com/office/drawing/2014/main" id="{AAFB6186-6570-4DE8-8603-70B0A51DFE9C}"/>
+                <a16:creationId xmlns:a16="http://schemas.microsoft.com/office/drawing/2014/main" xmlns="" id="{AAFB6186-6570-4DE8-8603-70B0A51DFE9C}"/>
               </a:ext>
             </a:extLst>
           </p:cNvPr>
@@ -2530,7 +2538,7 @@
           <p:cNvPr id="2" name="Title 1">
             <a:extLst>
               <a:ext uri="{FF2B5EF4-FFF2-40B4-BE49-F238E27FC236}">
-                <a16:creationId xmlns:a16="http://schemas.microsoft.com/office/drawing/2014/main" id="{EDA5ADD3-88C8-4B01-8CC6-808C0E416054}"/>
+                <a16:creationId xmlns:a16="http://schemas.microsoft.com/office/drawing/2014/main" xmlns="" id="{EDA5ADD3-88C8-4B01-8CC6-808C0E416054}"/>
               </a:ext>
             </a:extLst>
           </p:cNvPr>
@@ -2559,7 +2567,7 @@
           <p:cNvPr id="3" name="Date Placeholder 2">
             <a:extLst>
               <a:ext uri="{FF2B5EF4-FFF2-40B4-BE49-F238E27FC236}">
-                <a16:creationId xmlns:a16="http://schemas.microsoft.com/office/drawing/2014/main" id="{02634E6A-1390-4101-B78E-7592313407D7}"/>
+                <a16:creationId xmlns:a16="http://schemas.microsoft.com/office/drawing/2014/main" xmlns="" id="{02634E6A-1390-4101-B78E-7592313407D7}"/>
               </a:ext>
             </a:extLst>
           </p:cNvPr>
@@ -2577,7 +2585,7 @@
           <a:p>
             <a:fld id="{E3761515-4A26-4F31-9F61-5A10B1FABBFC}" type="datetime1">
               <a:rPr lang="en-US" smtClean="0"/>
-              <a:t>1/1/2022</a:t>
+              <a:t>1/2/2022</a:t>
             </a:fld>
             <a:endParaRPr lang="en-US"/>
           </a:p>
@@ -2588,7 +2596,7 @@
           <p:cNvPr id="4" name="Footer Placeholder 3">
             <a:extLst>
               <a:ext uri="{FF2B5EF4-FFF2-40B4-BE49-F238E27FC236}">
-                <a16:creationId xmlns:a16="http://schemas.microsoft.com/office/drawing/2014/main" id="{88BC7B90-4C99-4653-872A-3572A02DAE99}"/>
+                <a16:creationId xmlns:a16="http://schemas.microsoft.com/office/drawing/2014/main" xmlns="" id="{88BC7B90-4C99-4653-872A-3572A02DAE99}"/>
               </a:ext>
             </a:extLst>
           </p:cNvPr>
@@ -2616,7 +2624,7 @@
           <p:cNvPr id="5" name="Slide Number Placeholder 4">
             <a:extLst>
               <a:ext uri="{FF2B5EF4-FFF2-40B4-BE49-F238E27FC236}">
-                <a16:creationId xmlns:a16="http://schemas.microsoft.com/office/drawing/2014/main" id="{13B03516-4D31-49D2-9488-33C734A7A4F6}"/>
+                <a16:creationId xmlns:a16="http://schemas.microsoft.com/office/drawing/2014/main" xmlns="" id="{13B03516-4D31-49D2-9488-33C734A7A4F6}"/>
               </a:ext>
             </a:extLst>
           </p:cNvPr>
@@ -2675,7 +2683,7 @@
           <p:cNvPr id="2" name="Date Placeholder 1">
             <a:extLst>
               <a:ext uri="{FF2B5EF4-FFF2-40B4-BE49-F238E27FC236}">
-                <a16:creationId xmlns:a16="http://schemas.microsoft.com/office/drawing/2014/main" id="{610D8488-CF25-431B-A87A-AAF141BD0BBB}"/>
+                <a16:creationId xmlns:a16="http://schemas.microsoft.com/office/drawing/2014/main" xmlns="" id="{610D8488-CF25-431B-A87A-AAF141BD0BBB}"/>
               </a:ext>
             </a:extLst>
           </p:cNvPr>
@@ -2693,7 +2701,7 @@
           <a:p>
             <a:fld id="{4A75DC65-7D1F-4BAB-9695-F7E734143E14}" type="datetime1">
               <a:rPr lang="en-US" smtClean="0"/>
-              <a:t>1/1/2022</a:t>
+              <a:t>1/2/2022</a:t>
             </a:fld>
             <a:endParaRPr lang="en-US"/>
           </a:p>
@@ -2704,7 +2712,7 @@
           <p:cNvPr id="3" name="Footer Placeholder 2">
             <a:extLst>
               <a:ext uri="{FF2B5EF4-FFF2-40B4-BE49-F238E27FC236}">
-                <a16:creationId xmlns:a16="http://schemas.microsoft.com/office/drawing/2014/main" id="{8A2F58E5-C92D-4C64-B867-0576B1EADD06}"/>
+                <a16:creationId xmlns:a16="http://schemas.microsoft.com/office/drawing/2014/main" xmlns="" id="{8A2F58E5-C92D-4C64-B867-0576B1EADD06}"/>
               </a:ext>
             </a:extLst>
           </p:cNvPr>
@@ -2732,7 +2740,7 @@
           <p:cNvPr id="4" name="Slide Number Placeholder 3">
             <a:extLst>
               <a:ext uri="{FF2B5EF4-FFF2-40B4-BE49-F238E27FC236}">
-                <a16:creationId xmlns:a16="http://schemas.microsoft.com/office/drawing/2014/main" id="{89216797-ABEC-4FE0-AFDE-36107B96710D}"/>
+                <a16:creationId xmlns:a16="http://schemas.microsoft.com/office/drawing/2014/main" xmlns="" id="{89216797-ABEC-4FE0-AFDE-36107B96710D}"/>
               </a:ext>
             </a:extLst>
           </p:cNvPr>
@@ -2791,7 +2799,7 @@
           <p:cNvPr id="2" name="Title 1">
             <a:extLst>
               <a:ext uri="{FF2B5EF4-FFF2-40B4-BE49-F238E27FC236}">
-                <a16:creationId xmlns:a16="http://schemas.microsoft.com/office/drawing/2014/main" id="{FE68F2B0-990D-418E-9D10-2464E9866929}"/>
+                <a16:creationId xmlns:a16="http://schemas.microsoft.com/office/drawing/2014/main" xmlns="" id="{FE68F2B0-990D-418E-9D10-2464E9866929}"/>
               </a:ext>
             </a:extLst>
           </p:cNvPr>
@@ -2828,7 +2836,7 @@
           <p:cNvPr id="3" name="Content Placeholder 2">
             <a:extLst>
               <a:ext uri="{FF2B5EF4-FFF2-40B4-BE49-F238E27FC236}">
-                <a16:creationId xmlns:a16="http://schemas.microsoft.com/office/drawing/2014/main" id="{A6881131-AFFD-4339-9F30-D408B5105CB7}"/>
+                <a16:creationId xmlns:a16="http://schemas.microsoft.com/office/drawing/2014/main" xmlns="" id="{A6881131-AFFD-4339-9F30-D408B5105CB7}"/>
               </a:ext>
             </a:extLst>
           </p:cNvPr>
@@ -2918,7 +2926,7 @@
           <p:cNvPr id="4" name="Text Placeholder 3">
             <a:extLst>
               <a:ext uri="{FF2B5EF4-FFF2-40B4-BE49-F238E27FC236}">
-                <a16:creationId xmlns:a16="http://schemas.microsoft.com/office/drawing/2014/main" id="{7A7C47F4-7968-4698-8BD3-A583099FAA19}"/>
+                <a16:creationId xmlns:a16="http://schemas.microsoft.com/office/drawing/2014/main" xmlns="" id="{7A7C47F4-7968-4698-8BD3-A583099FAA19}"/>
               </a:ext>
             </a:extLst>
           </p:cNvPr>
@@ -2989,7 +2997,7 @@
           <p:cNvPr id="5" name="Date Placeholder 4">
             <a:extLst>
               <a:ext uri="{FF2B5EF4-FFF2-40B4-BE49-F238E27FC236}">
-                <a16:creationId xmlns:a16="http://schemas.microsoft.com/office/drawing/2014/main" id="{7E12BC6F-3996-4B2B-B8F2-DD3A82CCF76B}"/>
+                <a16:creationId xmlns:a16="http://schemas.microsoft.com/office/drawing/2014/main" xmlns="" id="{7E12BC6F-3996-4B2B-B8F2-DD3A82CCF76B}"/>
               </a:ext>
             </a:extLst>
           </p:cNvPr>
@@ -3007,7 +3015,7 @@
           <a:p>
             <a:fld id="{7E624077-BD55-4036-8E92-6558FDF3B653}" type="datetime1">
               <a:rPr lang="en-US" smtClean="0"/>
-              <a:t>1/1/2022</a:t>
+              <a:t>1/2/2022</a:t>
             </a:fld>
             <a:endParaRPr lang="en-US"/>
           </a:p>
@@ -3018,7 +3026,7 @@
           <p:cNvPr id="6" name="Footer Placeholder 5">
             <a:extLst>
               <a:ext uri="{FF2B5EF4-FFF2-40B4-BE49-F238E27FC236}">
-                <a16:creationId xmlns:a16="http://schemas.microsoft.com/office/drawing/2014/main" id="{EA832E66-581A-4CF2-A40A-4E24FAAC4AE4}"/>
+                <a16:creationId xmlns:a16="http://schemas.microsoft.com/office/drawing/2014/main" xmlns="" id="{EA832E66-581A-4CF2-A40A-4E24FAAC4AE4}"/>
               </a:ext>
             </a:extLst>
           </p:cNvPr>
@@ -3046,7 +3054,7 @@
           <p:cNvPr id="7" name="Slide Number Placeholder 6">
             <a:extLst>
               <a:ext uri="{FF2B5EF4-FFF2-40B4-BE49-F238E27FC236}">
-                <a16:creationId xmlns:a16="http://schemas.microsoft.com/office/drawing/2014/main" id="{E83B1C89-C625-4618-81A2-FB34E4DA0712}"/>
+                <a16:creationId xmlns:a16="http://schemas.microsoft.com/office/drawing/2014/main" xmlns="" id="{E83B1C89-C625-4618-81A2-FB34E4DA0712}"/>
               </a:ext>
             </a:extLst>
           </p:cNvPr>
@@ -3105,7 +3113,7 @@
           <p:cNvPr id="2" name="Title 1">
             <a:extLst>
               <a:ext uri="{FF2B5EF4-FFF2-40B4-BE49-F238E27FC236}">
-                <a16:creationId xmlns:a16="http://schemas.microsoft.com/office/drawing/2014/main" id="{F551486F-443A-4F2D-AB1F-8B1F4C4DE721}"/>
+                <a16:creationId xmlns:a16="http://schemas.microsoft.com/office/drawing/2014/main" xmlns="" id="{F551486F-443A-4F2D-AB1F-8B1F4C4DE721}"/>
               </a:ext>
             </a:extLst>
           </p:cNvPr>
@@ -3142,7 +3150,7 @@
           <p:cNvPr id="3" name="Picture Placeholder 2">
             <a:extLst>
               <a:ext uri="{FF2B5EF4-FFF2-40B4-BE49-F238E27FC236}">
-                <a16:creationId xmlns:a16="http://schemas.microsoft.com/office/drawing/2014/main" id="{E3A21213-E7FB-406A-B8CD-735AAC7AD0D9}"/>
+                <a16:creationId xmlns:a16="http://schemas.microsoft.com/office/drawing/2014/main" xmlns="" id="{E3A21213-E7FB-406A-B8CD-735AAC7AD0D9}"/>
               </a:ext>
             </a:extLst>
           </p:cNvPr>
@@ -3212,7 +3220,7 @@
           <p:cNvPr id="4" name="Text Placeholder 3">
             <a:extLst>
               <a:ext uri="{FF2B5EF4-FFF2-40B4-BE49-F238E27FC236}">
-                <a16:creationId xmlns:a16="http://schemas.microsoft.com/office/drawing/2014/main" id="{F4F41A03-500E-49F7-8D99-A1EAFE4D340B}"/>
+                <a16:creationId xmlns:a16="http://schemas.microsoft.com/office/drawing/2014/main" xmlns="" id="{F4F41A03-500E-49F7-8D99-A1EAFE4D340B}"/>
               </a:ext>
             </a:extLst>
           </p:cNvPr>
@@ -3283,7 +3291,7 @@
           <p:cNvPr id="5" name="Date Placeholder 4">
             <a:extLst>
               <a:ext uri="{FF2B5EF4-FFF2-40B4-BE49-F238E27FC236}">
-                <a16:creationId xmlns:a16="http://schemas.microsoft.com/office/drawing/2014/main" id="{5391523D-69E9-4EAE-A610-B3A237B75842}"/>
+                <a16:creationId xmlns:a16="http://schemas.microsoft.com/office/drawing/2014/main" xmlns="" id="{5391523D-69E9-4EAE-A610-B3A237B75842}"/>
               </a:ext>
             </a:extLst>
           </p:cNvPr>
@@ -3301,7 +3309,7 @@
           <a:p>
             <a:fld id="{804225F2-7107-4609-BCC2-77C63064A5E8}" type="datetime1">
               <a:rPr lang="en-US" smtClean="0"/>
-              <a:t>1/1/2022</a:t>
+              <a:t>1/2/2022</a:t>
             </a:fld>
             <a:endParaRPr lang="en-US"/>
           </a:p>
@@ -3312,7 +3320,7 @@
           <p:cNvPr id="6" name="Footer Placeholder 5">
             <a:extLst>
               <a:ext uri="{FF2B5EF4-FFF2-40B4-BE49-F238E27FC236}">
-                <a16:creationId xmlns:a16="http://schemas.microsoft.com/office/drawing/2014/main" id="{4EDB852F-4134-4AB5-BA87-483B1E1ADD21}"/>
+                <a16:creationId xmlns:a16="http://schemas.microsoft.com/office/drawing/2014/main" xmlns="" id="{4EDB852F-4134-4AB5-BA87-483B1E1ADD21}"/>
               </a:ext>
             </a:extLst>
           </p:cNvPr>
@@ -3340,7 +3348,7 @@
           <p:cNvPr id="7" name="Slide Number Placeholder 6">
             <a:extLst>
               <a:ext uri="{FF2B5EF4-FFF2-40B4-BE49-F238E27FC236}">
-                <a16:creationId xmlns:a16="http://schemas.microsoft.com/office/drawing/2014/main" id="{5E34C5CB-918E-4A09-8222-D36E37B63C02}"/>
+                <a16:creationId xmlns:a16="http://schemas.microsoft.com/office/drawing/2014/main" xmlns="" id="{5E34C5CB-918E-4A09-8222-D36E37B63C02}"/>
               </a:ext>
             </a:extLst>
           </p:cNvPr>
@@ -3404,7 +3412,7 @@
           <p:cNvPr id="2" name="Title Placeholder 1">
             <a:extLst>
               <a:ext uri="{FF2B5EF4-FFF2-40B4-BE49-F238E27FC236}">
-                <a16:creationId xmlns:a16="http://schemas.microsoft.com/office/drawing/2014/main" id="{63AA0686-7BAC-45C0-BA30-0D0CBCE5CE63}"/>
+                <a16:creationId xmlns:a16="http://schemas.microsoft.com/office/drawing/2014/main" xmlns="" id="{63AA0686-7BAC-45C0-BA30-0D0CBCE5CE63}"/>
               </a:ext>
             </a:extLst>
           </p:cNvPr>
@@ -3443,7 +3451,7 @@
           <p:cNvPr id="3" name="Text Placeholder 2">
             <a:extLst>
               <a:ext uri="{FF2B5EF4-FFF2-40B4-BE49-F238E27FC236}">
-                <a16:creationId xmlns:a16="http://schemas.microsoft.com/office/drawing/2014/main" id="{334202DE-82CD-407D-8C68-174B0CBB57F7}"/>
+                <a16:creationId xmlns:a16="http://schemas.microsoft.com/office/drawing/2014/main" xmlns="" id="{334202DE-82CD-407D-8C68-174B0CBB57F7}"/>
               </a:ext>
             </a:extLst>
           </p:cNvPr>
@@ -3511,7 +3519,7 @@
           <p:cNvPr id="4" name="Date Placeholder 3">
             <a:extLst>
               <a:ext uri="{FF2B5EF4-FFF2-40B4-BE49-F238E27FC236}">
-                <a16:creationId xmlns:a16="http://schemas.microsoft.com/office/drawing/2014/main" id="{2554AC9D-6E1B-46D3-959F-A068A1EDBDBA}"/>
+                <a16:creationId xmlns:a16="http://schemas.microsoft.com/office/drawing/2014/main" xmlns="" id="{2554AC9D-6E1B-46D3-959F-A068A1EDBDBA}"/>
               </a:ext>
             </a:extLst>
           </p:cNvPr>
@@ -3549,7 +3557,7 @@
           <a:p>
             <a:fld id="{D3FE42E8-8B57-452D-A122-4DCE9AC771EF}" type="datetime1">
               <a:rPr lang="en-US" smtClean="0"/>
-              <a:t>1/1/2022</a:t>
+              <a:t>1/2/2022</a:t>
             </a:fld>
             <a:endParaRPr lang="en-US"/>
           </a:p>
@@ -3560,7 +3568,7 @@
           <p:cNvPr id="5" name="Footer Placeholder 4">
             <a:extLst>
               <a:ext uri="{FF2B5EF4-FFF2-40B4-BE49-F238E27FC236}">
-                <a16:creationId xmlns:a16="http://schemas.microsoft.com/office/drawing/2014/main" id="{A5FC0015-9EFB-40F8-BC00-AC2483D60905}"/>
+                <a16:creationId xmlns:a16="http://schemas.microsoft.com/office/drawing/2014/main" xmlns="" id="{A5FC0015-9EFB-40F8-BC00-AC2483D60905}"/>
               </a:ext>
             </a:extLst>
           </p:cNvPr>
@@ -3608,7 +3616,7 @@
           <p:cNvPr id="6" name="Slide Number Placeholder 5">
             <a:extLst>
               <a:ext uri="{FF2B5EF4-FFF2-40B4-BE49-F238E27FC236}">
-                <a16:creationId xmlns:a16="http://schemas.microsoft.com/office/drawing/2014/main" id="{E572C732-0E3E-49E0-A72E-D4C08CB4455A}"/>
+                <a16:creationId xmlns:a16="http://schemas.microsoft.com/office/drawing/2014/main" xmlns="" id="{E572C732-0E3E-49E0-A72E-D4C08CB4455A}"/>
               </a:ext>
             </a:extLst>
           </p:cNvPr>
@@ -3658,7 +3666,7 @@
           <p:cNvPr id="7" name="ZoneTexte 6">
             <a:extLst>
               <a:ext uri="{FF2B5EF4-FFF2-40B4-BE49-F238E27FC236}">
-                <a16:creationId xmlns:a16="http://schemas.microsoft.com/office/drawing/2014/main" id="{375AC44C-9CFA-4E42-A090-4891AACF1AD3}"/>
+                <a16:creationId xmlns:a16="http://schemas.microsoft.com/office/drawing/2014/main" xmlns="" id="{375AC44C-9CFA-4E42-A090-4891AACF1AD3}"/>
               </a:ext>
             </a:extLst>
           </p:cNvPr>
@@ -4077,10 +4085,10 @@
           <p:cNvPr id="192" name="Rectangle 191">
             <a:extLst>
               <a:ext uri="{FF2B5EF4-FFF2-40B4-BE49-F238E27FC236}">
-                <a16:creationId xmlns:a16="http://schemas.microsoft.com/office/drawing/2014/main" id="{3C6DB943-79CD-46F9-83E1-9610EB176F2E}"/>
+                <a16:creationId xmlns:a16="http://schemas.microsoft.com/office/drawing/2014/main" xmlns="" id="{3C6DB943-79CD-46F9-83E1-9610EB176F2E}"/>
               </a:ext>
               <a:ext uri="{C183D7F6-B498-43B3-948B-1728B52AA6E4}">
-                <adec:decorative xmlns:adec="http://schemas.microsoft.com/office/drawing/2017/decorative" val="1"/>
+                <adec:decorative xmlns:adec="http://schemas.microsoft.com/office/drawing/2017/decorative" xmlns="" val="1"/>
               </a:ext>
             </a:extLst>
           </p:cNvPr>
@@ -4090,7 +4098,7 @@
           <p:nvPr>
             <p:extLst>
               <p:ext uri="{386F3935-93C4-4BCD-93E2-E3B085C9AB24}">
-                <p16:designElem xmlns:p16="http://schemas.microsoft.com/office/powerpoint/2015/main" val="1"/>
+                <p16:designElem xmlns:p16="http://schemas.microsoft.com/office/powerpoint/2015/main" xmlns="" val="1"/>
               </p:ext>
             </p:extLst>
           </p:nvPr>
@@ -4153,10 +4161,10 @@
           <p:cNvPr id="193" name="Rectangle 192">
             <a:extLst>
               <a:ext uri="{FF2B5EF4-FFF2-40B4-BE49-F238E27FC236}">
-                <a16:creationId xmlns:a16="http://schemas.microsoft.com/office/drawing/2014/main" id="{8337CC61-9E93-4D80-9F1C-12CE9A0C07F6}"/>
+                <a16:creationId xmlns:a16="http://schemas.microsoft.com/office/drawing/2014/main" xmlns="" id="{8337CC61-9E93-4D80-9F1C-12CE9A0C07F6}"/>
               </a:ext>
               <a:ext uri="{C183D7F6-B498-43B3-948B-1728B52AA6E4}">
-                <adec:decorative xmlns:adec="http://schemas.microsoft.com/office/drawing/2017/decorative" val="1"/>
+                <adec:decorative xmlns:adec="http://schemas.microsoft.com/office/drawing/2017/decorative" xmlns="" val="1"/>
               </a:ext>
             </a:extLst>
           </p:cNvPr>
@@ -4166,7 +4174,7 @@
           <p:nvPr>
             <p:extLst>
               <p:ext uri="{386F3935-93C4-4BCD-93E2-E3B085C9AB24}">
-                <p16:designElem xmlns:p16="http://schemas.microsoft.com/office/powerpoint/2015/main" val="1"/>
+                <p16:designElem xmlns:p16="http://schemas.microsoft.com/office/powerpoint/2015/main" xmlns="" val="1"/>
               </p:ext>
             </p:extLst>
           </p:nvPr>
@@ -4219,7 +4227,7 @@
           <p:cNvPr id="2" name="Titre 1">
             <a:extLst>
               <a:ext uri="{FF2B5EF4-FFF2-40B4-BE49-F238E27FC236}">
-                <a16:creationId xmlns:a16="http://schemas.microsoft.com/office/drawing/2014/main" id="{C44A7453-7718-428F-BCDA-397850F4502F}"/>
+                <a16:creationId xmlns:a16="http://schemas.microsoft.com/office/drawing/2014/main" xmlns="" id="{C44A7453-7718-428F-BCDA-397850F4502F}"/>
               </a:ext>
             </a:extLst>
           </p:cNvPr>
@@ -4302,7 +4310,7 @@
           <p:cNvPr id="3" name="Sous-titre 2">
             <a:extLst>
               <a:ext uri="{FF2B5EF4-FFF2-40B4-BE49-F238E27FC236}">
-                <a16:creationId xmlns:a16="http://schemas.microsoft.com/office/drawing/2014/main" id="{5DC5A724-FCDD-4750-B5A1-9C692200D578}"/>
+                <a16:creationId xmlns:a16="http://schemas.microsoft.com/office/drawing/2014/main" xmlns="" id="{5DC5A724-FCDD-4750-B5A1-9C692200D578}"/>
               </a:ext>
             </a:extLst>
           </p:cNvPr>
@@ -4407,7 +4415,7 @@
           <p:cNvPr id="1028" name="Picture 4">
             <a:extLst>
               <a:ext uri="{FF2B5EF4-FFF2-40B4-BE49-F238E27FC236}">
-                <a16:creationId xmlns:a16="http://schemas.microsoft.com/office/drawing/2014/main" id="{29E157D2-7F24-4F66-BE80-3E45C8787A7F}"/>
+                <a16:creationId xmlns:a16="http://schemas.microsoft.com/office/drawing/2014/main" xmlns="" id="{29E157D2-7F24-4F66-BE80-3E45C8787A7F}"/>
               </a:ext>
             </a:extLst>
           </p:cNvPr>
@@ -4491,10 +4499,10 @@
           <p:cNvPr id="30" name="Rectangle 29">
             <a:extLst>
               <a:ext uri="{FF2B5EF4-FFF2-40B4-BE49-F238E27FC236}">
-                <a16:creationId xmlns:a16="http://schemas.microsoft.com/office/drawing/2014/main" id="{B3E5064B-BAF4-48C7-8C2C-8219FF24A7A4}"/>
+                <a16:creationId xmlns:a16="http://schemas.microsoft.com/office/drawing/2014/main" xmlns="" id="{B3E5064B-BAF4-48C7-8C2C-8219FF24A7A4}"/>
               </a:ext>
               <a:ext uri="{C183D7F6-B498-43B3-948B-1728B52AA6E4}">
-                <adec:decorative xmlns:adec="http://schemas.microsoft.com/office/drawing/2017/decorative" val="1"/>
+                <adec:decorative xmlns:adec="http://schemas.microsoft.com/office/drawing/2017/decorative" xmlns="" val="1"/>
               </a:ext>
             </a:extLst>
           </p:cNvPr>
@@ -4504,7 +4512,7 @@
           <p:nvPr>
             <p:extLst>
               <p:ext uri="{386F3935-93C4-4BCD-93E2-E3B085C9AB24}">
-                <p16:designElem xmlns:p16="http://schemas.microsoft.com/office/powerpoint/2015/main" val="1"/>
+                <p16:designElem xmlns:p16="http://schemas.microsoft.com/office/powerpoint/2015/main" xmlns="" val="1"/>
               </p:ext>
             </p:extLst>
           </p:nvPr>
@@ -4567,10 +4575,10 @@
           <p:cNvPr id="32" name="Rectangle 31">
             <a:extLst>
               <a:ext uri="{FF2B5EF4-FFF2-40B4-BE49-F238E27FC236}">
-                <a16:creationId xmlns:a16="http://schemas.microsoft.com/office/drawing/2014/main" id="{8A7C3535-4FB5-4E5B-BDFE-FA61877AF1A9}"/>
+                <a16:creationId xmlns:a16="http://schemas.microsoft.com/office/drawing/2014/main" xmlns="" id="{8A7C3535-4FB5-4E5B-BDFE-FA61877AF1A9}"/>
               </a:ext>
               <a:ext uri="{C183D7F6-B498-43B3-948B-1728B52AA6E4}">
-                <adec:decorative xmlns:adec="http://schemas.microsoft.com/office/drawing/2017/decorative" val="1"/>
+                <adec:decorative xmlns:adec="http://schemas.microsoft.com/office/drawing/2017/decorative" xmlns="" val="1"/>
               </a:ext>
             </a:extLst>
           </p:cNvPr>
@@ -4580,7 +4588,7 @@
           <p:nvPr>
             <p:extLst>
               <p:ext uri="{386F3935-93C4-4BCD-93E2-E3B085C9AB24}">
-                <p16:designElem xmlns:p16="http://schemas.microsoft.com/office/powerpoint/2015/main" val="1"/>
+                <p16:designElem xmlns:p16="http://schemas.microsoft.com/office/powerpoint/2015/main" xmlns="" val="1"/>
               </p:ext>
             </p:extLst>
           </p:nvPr>
@@ -4634,10 +4642,10 @@
           <p:cNvPr id="34" name="Rectangle 33">
             <a:extLst>
               <a:ext uri="{FF2B5EF4-FFF2-40B4-BE49-F238E27FC236}">
-                <a16:creationId xmlns:a16="http://schemas.microsoft.com/office/drawing/2014/main" id="{23E33EB3-397E-4C5F-B561-7FEE7C781FB7}"/>
+                <a16:creationId xmlns:a16="http://schemas.microsoft.com/office/drawing/2014/main" xmlns="" id="{23E33EB3-397E-4C5F-B561-7FEE7C781FB7}"/>
               </a:ext>
               <a:ext uri="{C183D7F6-B498-43B3-948B-1728B52AA6E4}">
-                <adec:decorative xmlns:adec="http://schemas.microsoft.com/office/drawing/2017/decorative" val="1"/>
+                <adec:decorative xmlns:adec="http://schemas.microsoft.com/office/drawing/2017/decorative" xmlns="" val="1"/>
               </a:ext>
             </a:extLst>
           </p:cNvPr>
@@ -4647,7 +4655,7 @@
           <p:nvPr>
             <p:extLst>
               <p:ext uri="{386F3935-93C4-4BCD-93E2-E3B085C9AB24}">
-                <p16:designElem xmlns:p16="http://schemas.microsoft.com/office/powerpoint/2015/main" val="1"/>
+                <p16:designElem xmlns:p16="http://schemas.microsoft.com/office/powerpoint/2015/main" xmlns="" val="1"/>
               </p:ext>
             </p:extLst>
           </p:nvPr>
@@ -4694,7 +4702,7 @@
           <p:cNvPr id="2" name="Titre 1">
             <a:extLst>
               <a:ext uri="{FF2B5EF4-FFF2-40B4-BE49-F238E27FC236}">
-                <a16:creationId xmlns:a16="http://schemas.microsoft.com/office/drawing/2014/main" id="{11E9F62F-C54F-46BF-AAD7-5996504CC594}"/>
+                <a16:creationId xmlns:a16="http://schemas.microsoft.com/office/drawing/2014/main" xmlns="" id="{11E9F62F-C54F-46BF-AAD7-5996504CC594}"/>
               </a:ext>
             </a:extLst>
           </p:cNvPr>
@@ -4755,7 +4763,7 @@
           <p:cNvPr id="5" name="Image 4">
             <a:extLst>
               <a:ext uri="{FF2B5EF4-FFF2-40B4-BE49-F238E27FC236}">
-                <a16:creationId xmlns:a16="http://schemas.microsoft.com/office/drawing/2014/main" id="{A6ADE3BE-BD50-4A71-9338-10253ECE0E7C}"/>
+                <a16:creationId xmlns:a16="http://schemas.microsoft.com/office/drawing/2014/main" xmlns="" id="{A6ADE3BE-BD50-4A71-9338-10253ECE0E7C}"/>
               </a:ext>
             </a:extLst>
           </p:cNvPr>
@@ -4772,104 +4780,514 @@
         </p:blipFill>
         <p:spPr>
           <a:xfrm>
-            <a:off x="1121815" y="3286954"/>
-            <a:ext cx="4974185" cy="2487093"/>
+            <a:off x="1284850" y="2240272"/>
+            <a:ext cx="5935808" cy="2967905"/>
           </a:xfrm>
           <a:prstGeom prst="rect">
             <a:avLst/>
           </a:prstGeom>
         </p:spPr>
       </p:pic>
-      <p:pic>
-        <p:nvPicPr>
-          <p:cNvPr id="9" name="Image 8">
-            <a:extLst>
-              <a:ext uri="{FF2B5EF4-FFF2-40B4-BE49-F238E27FC236}">
-                <a16:creationId xmlns:a16="http://schemas.microsoft.com/office/drawing/2014/main" id="{79291A25-0532-4DD6-9090-30E2A5D6A951}"/>
-              </a:ext>
-            </a:extLst>
-          </p:cNvPr>
-          <p:cNvPicPr>
-            <a:picLocks noChangeAspect="1"/>
-          </p:cNvPicPr>
+      <p:sp>
+        <p:nvSpPr>
+          <p:cNvPr id="4" name="ZoneTexte 3"/>
+          <p:cNvSpPr txBox="1"/>
           <p:nvPr/>
-        </p:nvPicPr>
-        <p:blipFill>
-          <a:blip r:embed="rId3"/>
-          <a:stretch>
-            <a:fillRect/>
-          </a:stretch>
-        </p:blipFill>
-        <p:spPr>
-          <a:xfrm>
-            <a:off x="2662237" y="1600200"/>
-            <a:ext cx="6867525" cy="3657600"/>
+        </p:nvSpPr>
+        <p:spPr>
+          <a:xfrm>
+            <a:off x="7619122" y="2824664"/>
+            <a:ext cx="3277185" cy="2062103"/>
           </a:xfrm>
           <a:prstGeom prst="rect">
             <a:avLst/>
           </a:prstGeom>
-        </p:spPr>
-      </p:pic>
-      <p:pic>
-        <p:nvPicPr>
-          <p:cNvPr id="11" name="Image 10">
-            <a:extLst>
-              <a:ext uri="{FF2B5EF4-FFF2-40B4-BE49-F238E27FC236}">
-                <a16:creationId xmlns:a16="http://schemas.microsoft.com/office/drawing/2014/main" id="{53208F83-5978-453E-9A17-8A42E0E8B8D3}"/>
-              </a:ext>
-            </a:extLst>
-          </p:cNvPr>
-          <p:cNvPicPr>
-            <a:picLocks noChangeAspect="1"/>
-          </p:cNvPicPr>
-          <p:nvPr/>
-        </p:nvPicPr>
-        <p:blipFill>
-          <a:blip r:embed="rId4"/>
-          <a:stretch>
-            <a:fillRect/>
-          </a:stretch>
-        </p:blipFill>
-        <p:spPr>
-          <a:xfrm>
-            <a:off x="2609850" y="1562100"/>
-            <a:ext cx="6972300" cy="3733800"/>
-          </a:xfrm>
-          <a:prstGeom prst="rect">
-            <a:avLst/>
-          </a:prstGeom>
-        </p:spPr>
-      </p:pic>
-      <p:pic>
-        <p:nvPicPr>
-          <p:cNvPr id="14" name="Image 13">
-            <a:extLst>
-              <a:ext uri="{FF2B5EF4-FFF2-40B4-BE49-F238E27FC236}">
-                <a16:creationId xmlns:a16="http://schemas.microsoft.com/office/drawing/2014/main" id="{2599AFEE-C634-4243-AE13-F6C87F125960}"/>
-              </a:ext>
-            </a:extLst>
-          </p:cNvPr>
-          <p:cNvPicPr>
-            <a:picLocks noChangeAspect="1"/>
-          </p:cNvPicPr>
-          <p:nvPr/>
-        </p:nvPicPr>
-        <p:blipFill>
-          <a:blip r:embed="rId5"/>
-          <a:stretch>
-            <a:fillRect/>
-          </a:stretch>
-        </p:blipFill>
-        <p:spPr>
-          <a:xfrm>
-            <a:off x="4585410" y="1773848"/>
-            <a:ext cx="5629275" cy="4219575"/>
-          </a:xfrm>
-          <a:prstGeom prst="rect">
-            <a:avLst/>
-          </a:prstGeom>
-        </p:spPr>
-      </p:pic>
+          <a:noFill/>
+        </p:spPr>
+        <p:txBody>
+          <a:bodyPr wrap="square" rtlCol="0">
+            <a:spAutoFit/>
+          </a:bodyPr>
+          <a:lstStyle/>
+          <a:p>
+            <a:pPr algn="just"/>
+            <a:r>
+              <a:rPr lang="fr-FR" sz="1600" dirty="0" err="1">
+                <a:solidFill>
+                  <a:schemeClr val="tx2"/>
+                </a:solidFill>
+                <a:latin typeface="-apple-system"/>
+              </a:rPr>
+              <a:t>We</a:t>
+            </a:r>
+            <a:r>
+              <a:rPr lang="fr-FR" sz="1600" dirty="0">
+                <a:solidFill>
+                  <a:schemeClr val="tx2"/>
+                </a:solidFill>
+                <a:latin typeface="-apple-system"/>
+              </a:rPr>
+              <a:t> </a:t>
+            </a:r>
+            <a:r>
+              <a:rPr lang="fr-FR" sz="1600" dirty="0" err="1">
+                <a:solidFill>
+                  <a:schemeClr val="tx2"/>
+                </a:solidFill>
+                <a:latin typeface="-apple-system"/>
+              </a:rPr>
+              <a:t>can</a:t>
+            </a:r>
+            <a:r>
+              <a:rPr lang="fr-FR" sz="1600" dirty="0">
+                <a:solidFill>
+                  <a:schemeClr val="tx2"/>
+                </a:solidFill>
+                <a:latin typeface="-apple-system"/>
+              </a:rPr>
+              <a:t> </a:t>
+            </a:r>
+            <a:r>
+              <a:rPr lang="fr-FR" sz="1600" dirty="0" err="1">
+                <a:solidFill>
+                  <a:schemeClr val="tx2"/>
+                </a:solidFill>
+                <a:latin typeface="-apple-system"/>
+              </a:rPr>
+              <a:t>see</a:t>
+            </a:r>
+            <a:r>
+              <a:rPr lang="fr-FR" sz="1600" dirty="0">
+                <a:solidFill>
+                  <a:schemeClr val="tx2"/>
+                </a:solidFill>
+                <a:latin typeface="-apple-system"/>
+              </a:rPr>
+              <a:t> on </a:t>
+            </a:r>
+            <a:r>
+              <a:rPr lang="fr-FR" sz="1600" dirty="0" err="1">
+                <a:solidFill>
+                  <a:schemeClr val="tx2"/>
+                </a:solidFill>
+                <a:latin typeface="-apple-system"/>
+              </a:rPr>
+              <a:t>this</a:t>
+            </a:r>
+            <a:r>
+              <a:rPr lang="fr-FR" sz="1600" dirty="0">
+                <a:solidFill>
+                  <a:schemeClr val="tx2"/>
+                </a:solidFill>
+                <a:latin typeface="-apple-system"/>
+              </a:rPr>
+              <a:t> </a:t>
+            </a:r>
+            <a:r>
+              <a:rPr lang="fr-FR" sz="1600" dirty="0" err="1">
+                <a:solidFill>
+                  <a:schemeClr val="tx2"/>
+                </a:solidFill>
+                <a:latin typeface="-apple-system"/>
+              </a:rPr>
+              <a:t>boxplot</a:t>
+            </a:r>
+            <a:r>
+              <a:rPr lang="fr-FR" sz="1600" dirty="0">
+                <a:solidFill>
+                  <a:schemeClr val="tx2"/>
+                </a:solidFill>
+                <a:latin typeface="-apple-system"/>
+              </a:rPr>
+              <a:t> </a:t>
+            </a:r>
+            <a:r>
+              <a:rPr lang="fr-FR" sz="1600" dirty="0" err="1">
+                <a:solidFill>
+                  <a:schemeClr val="tx2"/>
+                </a:solidFill>
+                <a:latin typeface="-apple-system"/>
+              </a:rPr>
+              <a:t>that</a:t>
+            </a:r>
+            <a:r>
+              <a:rPr lang="fr-FR" sz="1600" dirty="0">
+                <a:solidFill>
+                  <a:schemeClr val="tx2"/>
+                </a:solidFill>
+                <a:latin typeface="-apple-system"/>
+              </a:rPr>
+              <a:t> bikes are </a:t>
+            </a:r>
+            <a:r>
+              <a:rPr lang="fr-FR" sz="1600" dirty="0" err="1">
+                <a:solidFill>
+                  <a:schemeClr val="tx2"/>
+                </a:solidFill>
+                <a:latin typeface="-apple-system"/>
+              </a:rPr>
+              <a:t>usually</a:t>
+            </a:r>
+            <a:r>
+              <a:rPr lang="fr-FR" sz="1600" dirty="0">
+                <a:solidFill>
+                  <a:schemeClr val="tx2"/>
+                </a:solidFill>
+                <a:latin typeface="-apple-system"/>
+              </a:rPr>
+              <a:t> more </a:t>
+            </a:r>
+            <a:r>
+              <a:rPr lang="fr-FR" sz="1600" dirty="0" err="1">
+                <a:solidFill>
+                  <a:schemeClr val="tx2"/>
+                </a:solidFill>
+                <a:latin typeface="-apple-system"/>
+              </a:rPr>
+              <a:t>rented</a:t>
+            </a:r>
+            <a:r>
+              <a:rPr lang="fr-FR" sz="1600" dirty="0">
+                <a:solidFill>
+                  <a:schemeClr val="tx2"/>
+                </a:solidFill>
+                <a:latin typeface="-apple-system"/>
+              </a:rPr>
+              <a:t> in </a:t>
+            </a:r>
+            <a:r>
+              <a:rPr lang="fr-FR" sz="1600" dirty="0" err="1">
+                <a:solidFill>
+                  <a:schemeClr val="tx2"/>
+                </a:solidFill>
+                <a:latin typeface="-apple-system"/>
+              </a:rPr>
+              <a:t>Summer</a:t>
+            </a:r>
+            <a:r>
+              <a:rPr lang="fr-FR" sz="1600" dirty="0">
+                <a:solidFill>
+                  <a:schemeClr val="tx2"/>
+                </a:solidFill>
+                <a:latin typeface="-apple-system"/>
+              </a:rPr>
+              <a:t> </a:t>
+            </a:r>
+            <a:r>
+              <a:rPr lang="fr-FR" sz="1600" dirty="0">
+                <a:solidFill>
+                  <a:schemeClr val="tx2"/>
+                </a:solidFill>
+                <a:latin typeface="-apple-system"/>
+              </a:rPr>
+              <a:t>and are </a:t>
+            </a:r>
+            <a:r>
+              <a:rPr lang="fr-FR" sz="1600" dirty="0" err="1">
+                <a:solidFill>
+                  <a:schemeClr val="tx2"/>
+                </a:solidFill>
+                <a:latin typeface="-apple-system"/>
+              </a:rPr>
+              <a:t>very</a:t>
+            </a:r>
+            <a:r>
+              <a:rPr lang="fr-FR" sz="1600" dirty="0">
+                <a:solidFill>
+                  <a:schemeClr val="tx2"/>
+                </a:solidFill>
+                <a:latin typeface="-apple-system"/>
+              </a:rPr>
+              <a:t> </a:t>
+            </a:r>
+            <a:r>
+              <a:rPr lang="fr-FR" sz="1600" dirty="0" err="1">
+                <a:solidFill>
+                  <a:schemeClr val="tx2"/>
+                </a:solidFill>
+                <a:latin typeface="-apple-system"/>
+              </a:rPr>
+              <a:t>less</a:t>
+            </a:r>
+            <a:r>
+              <a:rPr lang="fr-FR" sz="1600" dirty="0">
+                <a:solidFill>
+                  <a:schemeClr val="tx2"/>
+                </a:solidFill>
+                <a:latin typeface="-apple-system"/>
+              </a:rPr>
+              <a:t> </a:t>
+            </a:r>
+            <a:r>
+              <a:rPr lang="fr-FR" sz="1600" dirty="0" err="1">
+                <a:solidFill>
+                  <a:schemeClr val="tx2"/>
+                </a:solidFill>
+                <a:latin typeface="-apple-system"/>
+              </a:rPr>
+              <a:t>rented</a:t>
+            </a:r>
+            <a:r>
+              <a:rPr lang="fr-FR" sz="1600" dirty="0">
+                <a:solidFill>
+                  <a:schemeClr val="tx2"/>
+                </a:solidFill>
+                <a:latin typeface="-apple-system"/>
+              </a:rPr>
+              <a:t> </a:t>
+            </a:r>
+            <a:r>
+              <a:rPr lang="fr-FR" sz="1600" dirty="0" err="1">
+                <a:solidFill>
+                  <a:schemeClr val="tx2"/>
+                </a:solidFill>
+                <a:latin typeface="-apple-system"/>
+              </a:rPr>
+              <a:t>during</a:t>
+            </a:r>
+            <a:r>
+              <a:rPr lang="fr-FR" sz="1600" dirty="0">
+                <a:solidFill>
+                  <a:schemeClr val="tx2"/>
+                </a:solidFill>
+                <a:latin typeface="-apple-system"/>
+              </a:rPr>
+              <a:t> Winter. The </a:t>
+            </a:r>
+            <a:r>
+              <a:rPr lang="fr-FR" sz="1600" dirty="0" err="1">
+                <a:solidFill>
+                  <a:schemeClr val="tx2"/>
+                </a:solidFill>
+                <a:latin typeface="-apple-system"/>
+              </a:rPr>
+              <a:t>amount</a:t>
+            </a:r>
+            <a:r>
+              <a:rPr lang="fr-FR" sz="1600" dirty="0">
+                <a:solidFill>
+                  <a:schemeClr val="tx2"/>
+                </a:solidFill>
+                <a:latin typeface="-apple-system"/>
+              </a:rPr>
+              <a:t> of bikes </a:t>
+            </a:r>
+            <a:r>
+              <a:rPr lang="fr-FR" sz="1600" dirty="0" err="1">
+                <a:solidFill>
+                  <a:schemeClr val="tx2"/>
+                </a:solidFill>
+                <a:latin typeface="-apple-system"/>
+              </a:rPr>
+              <a:t>rented</a:t>
+            </a:r>
+            <a:r>
+              <a:rPr lang="fr-FR" sz="1600" dirty="0">
+                <a:solidFill>
+                  <a:schemeClr val="tx2"/>
+                </a:solidFill>
+                <a:latin typeface="-apple-system"/>
+              </a:rPr>
+              <a:t> </a:t>
+            </a:r>
+            <a:r>
+              <a:rPr lang="fr-FR" sz="1600" dirty="0" err="1">
+                <a:solidFill>
+                  <a:schemeClr val="tx2"/>
+                </a:solidFill>
+                <a:latin typeface="-apple-system"/>
+              </a:rPr>
+              <a:t>during</a:t>
+            </a:r>
+            <a:r>
+              <a:rPr lang="fr-FR" sz="1600" dirty="0">
+                <a:solidFill>
+                  <a:schemeClr val="tx2"/>
+                </a:solidFill>
+                <a:latin typeface="-apple-system"/>
+              </a:rPr>
+              <a:t> </a:t>
+            </a:r>
+            <a:r>
+              <a:rPr lang="fr-FR" sz="1600" dirty="0" err="1">
+                <a:solidFill>
+                  <a:schemeClr val="tx2"/>
+                </a:solidFill>
+                <a:latin typeface="-apple-system"/>
+              </a:rPr>
+              <a:t>Spring</a:t>
+            </a:r>
+            <a:r>
+              <a:rPr lang="fr-FR" sz="1600" dirty="0">
+                <a:solidFill>
+                  <a:schemeClr val="tx2"/>
+                </a:solidFill>
+                <a:latin typeface="-apple-system"/>
+              </a:rPr>
+              <a:t> and </a:t>
+            </a:r>
+            <a:r>
+              <a:rPr lang="fr-FR" sz="1600" dirty="0" err="1">
+                <a:solidFill>
+                  <a:schemeClr val="tx2"/>
+                </a:solidFill>
+                <a:latin typeface="-apple-system"/>
+              </a:rPr>
+              <a:t>Autumn</a:t>
+            </a:r>
+            <a:r>
+              <a:rPr lang="fr-FR" sz="1600" dirty="0">
+                <a:solidFill>
+                  <a:schemeClr val="tx2"/>
+                </a:solidFill>
+                <a:latin typeface="-apple-system"/>
+              </a:rPr>
+              <a:t> </a:t>
+            </a:r>
+            <a:r>
+              <a:rPr lang="fr-FR" sz="1600" dirty="0" err="1">
+                <a:solidFill>
+                  <a:schemeClr val="tx2"/>
+                </a:solidFill>
+                <a:latin typeface="-apple-system"/>
+              </a:rPr>
+              <a:t>seems</a:t>
+            </a:r>
+            <a:r>
+              <a:rPr lang="fr-FR" sz="1600" dirty="0">
+                <a:solidFill>
+                  <a:schemeClr val="tx2"/>
+                </a:solidFill>
+                <a:latin typeface="-apple-system"/>
+              </a:rPr>
+              <a:t> </a:t>
+            </a:r>
+            <a:r>
+              <a:rPr lang="fr-FR" sz="1600" dirty="0" err="1">
+                <a:solidFill>
+                  <a:schemeClr val="tx2"/>
+                </a:solidFill>
+                <a:latin typeface="-apple-system"/>
+              </a:rPr>
+              <a:t>equivalent</a:t>
+            </a:r>
+            <a:r>
+              <a:rPr lang="fr-FR" sz="1600" dirty="0">
+                <a:solidFill>
+                  <a:schemeClr val="tx2"/>
+                </a:solidFill>
+                <a:latin typeface="-apple-system"/>
+              </a:rPr>
+              <a:t>, as the </a:t>
+            </a:r>
+            <a:r>
+              <a:rPr lang="fr-FR" sz="1600" dirty="0" err="1">
+                <a:solidFill>
+                  <a:schemeClr val="tx2"/>
+                </a:solidFill>
+                <a:latin typeface="-apple-system"/>
+              </a:rPr>
+              <a:t>seasons</a:t>
+            </a:r>
+            <a:r>
+              <a:rPr lang="fr-FR" sz="1600" dirty="0">
+                <a:solidFill>
+                  <a:schemeClr val="tx2"/>
+                </a:solidFill>
+                <a:latin typeface="-apple-system"/>
+              </a:rPr>
+              <a:t> do not </a:t>
+            </a:r>
+            <a:r>
+              <a:rPr lang="fr-FR" sz="1600" dirty="0" err="1">
+                <a:solidFill>
+                  <a:schemeClr val="tx2"/>
+                </a:solidFill>
+                <a:latin typeface="-apple-system"/>
+              </a:rPr>
+              <a:t>really</a:t>
+            </a:r>
+            <a:r>
+              <a:rPr lang="fr-FR" sz="1600" dirty="0">
+                <a:solidFill>
+                  <a:schemeClr val="tx2"/>
+                </a:solidFill>
+                <a:latin typeface="-apple-system"/>
+              </a:rPr>
+              <a:t> </a:t>
+            </a:r>
+            <a:r>
+              <a:rPr lang="fr-FR" sz="1600" dirty="0" err="1">
+                <a:solidFill>
+                  <a:schemeClr val="tx2"/>
+                </a:solidFill>
+                <a:latin typeface="-apple-system"/>
+              </a:rPr>
+              <a:t>differ</a:t>
+            </a:r>
+            <a:r>
+              <a:rPr lang="fr-FR" sz="1600" dirty="0">
+                <a:solidFill>
+                  <a:schemeClr val="tx2"/>
+                </a:solidFill>
+                <a:latin typeface="-apple-system"/>
+              </a:rPr>
+              <a:t> </a:t>
+            </a:r>
+            <a:r>
+              <a:rPr lang="fr-FR" sz="1600" dirty="0" err="1">
+                <a:solidFill>
+                  <a:schemeClr val="tx2"/>
+                </a:solidFill>
+                <a:latin typeface="-apple-system"/>
+              </a:rPr>
+              <a:t>from</a:t>
+            </a:r>
+            <a:r>
+              <a:rPr lang="fr-FR" sz="1600" dirty="0">
+                <a:solidFill>
+                  <a:schemeClr val="tx2"/>
+                </a:solidFill>
+                <a:latin typeface="-apple-system"/>
+              </a:rPr>
+              <a:t> </a:t>
+            </a:r>
+            <a:r>
+              <a:rPr lang="fr-FR" sz="1600" dirty="0" err="1">
+                <a:solidFill>
+                  <a:schemeClr val="tx2"/>
+                </a:solidFill>
+                <a:latin typeface="-apple-system"/>
+              </a:rPr>
+              <a:t>each</a:t>
+            </a:r>
+            <a:r>
+              <a:rPr lang="fr-FR" sz="1600" dirty="0">
+                <a:solidFill>
+                  <a:schemeClr val="tx2"/>
+                </a:solidFill>
+                <a:latin typeface="-apple-system"/>
+              </a:rPr>
+              <a:t> </a:t>
+            </a:r>
+            <a:r>
+              <a:rPr lang="fr-FR" sz="1600" dirty="0" err="1">
+                <a:solidFill>
+                  <a:schemeClr val="tx2"/>
+                </a:solidFill>
+                <a:latin typeface="-apple-system"/>
+              </a:rPr>
+              <a:t>other</a:t>
+            </a:r>
+            <a:endParaRPr lang="fr-FR" sz="1600" dirty="0">
+              <a:solidFill>
+                <a:schemeClr val="tx2"/>
+              </a:solidFill>
+              <a:latin typeface="-apple-system"/>
+            </a:endParaRPr>
+          </a:p>
+        </p:txBody>
+      </p:sp>
     </p:spTree>
     <p:extLst>
       <p:ext uri="{BB962C8B-B14F-4D97-AF65-F5344CB8AC3E}">
@@ -4913,10 +5331,10 @@
           <p:cNvPr id="30" name="Rectangle 29">
             <a:extLst>
               <a:ext uri="{FF2B5EF4-FFF2-40B4-BE49-F238E27FC236}">
-                <a16:creationId xmlns:a16="http://schemas.microsoft.com/office/drawing/2014/main" id="{B3E5064B-BAF4-48C7-8C2C-8219FF24A7A4}"/>
+                <a16:creationId xmlns:a16="http://schemas.microsoft.com/office/drawing/2014/main" xmlns="" id="{B3E5064B-BAF4-48C7-8C2C-8219FF24A7A4}"/>
               </a:ext>
               <a:ext uri="{C183D7F6-B498-43B3-948B-1728B52AA6E4}">
-                <adec:decorative xmlns:adec="http://schemas.microsoft.com/office/drawing/2017/decorative" val="1"/>
+                <adec:decorative xmlns:adec="http://schemas.microsoft.com/office/drawing/2017/decorative" xmlns="" val="1"/>
               </a:ext>
             </a:extLst>
           </p:cNvPr>
@@ -4926,7 +5344,7 @@
           <p:nvPr>
             <p:extLst>
               <p:ext uri="{386F3935-93C4-4BCD-93E2-E3B085C9AB24}">
-                <p16:designElem xmlns:p16="http://schemas.microsoft.com/office/powerpoint/2015/main" val="1"/>
+                <p16:designElem xmlns:p16="http://schemas.microsoft.com/office/powerpoint/2015/main" xmlns="" val="1"/>
               </p:ext>
             </p:extLst>
           </p:nvPr>
@@ -4989,10 +5407,10 @@
           <p:cNvPr id="32" name="Rectangle 31">
             <a:extLst>
               <a:ext uri="{FF2B5EF4-FFF2-40B4-BE49-F238E27FC236}">
-                <a16:creationId xmlns:a16="http://schemas.microsoft.com/office/drawing/2014/main" id="{8A7C3535-4FB5-4E5B-BDFE-FA61877AF1A9}"/>
+                <a16:creationId xmlns:a16="http://schemas.microsoft.com/office/drawing/2014/main" xmlns="" id="{8A7C3535-4FB5-4E5B-BDFE-FA61877AF1A9}"/>
               </a:ext>
               <a:ext uri="{C183D7F6-B498-43B3-948B-1728B52AA6E4}">
-                <adec:decorative xmlns:adec="http://schemas.microsoft.com/office/drawing/2017/decorative" val="1"/>
+                <adec:decorative xmlns:adec="http://schemas.microsoft.com/office/drawing/2017/decorative" xmlns="" val="1"/>
               </a:ext>
             </a:extLst>
           </p:cNvPr>
@@ -5002,7 +5420,7 @@
           <p:nvPr>
             <p:extLst>
               <p:ext uri="{386F3935-93C4-4BCD-93E2-E3B085C9AB24}">
-                <p16:designElem xmlns:p16="http://schemas.microsoft.com/office/powerpoint/2015/main" val="1"/>
+                <p16:designElem xmlns:p16="http://schemas.microsoft.com/office/powerpoint/2015/main" xmlns="" val="1"/>
               </p:ext>
             </p:extLst>
           </p:nvPr>
@@ -5056,10 +5474,10 @@
           <p:cNvPr id="34" name="Rectangle 33">
             <a:extLst>
               <a:ext uri="{FF2B5EF4-FFF2-40B4-BE49-F238E27FC236}">
-                <a16:creationId xmlns:a16="http://schemas.microsoft.com/office/drawing/2014/main" id="{23E33EB3-397E-4C5F-B561-7FEE7C781FB7}"/>
+                <a16:creationId xmlns:a16="http://schemas.microsoft.com/office/drawing/2014/main" xmlns="" id="{23E33EB3-397E-4C5F-B561-7FEE7C781FB7}"/>
               </a:ext>
               <a:ext uri="{C183D7F6-B498-43B3-948B-1728B52AA6E4}">
-                <adec:decorative xmlns:adec="http://schemas.microsoft.com/office/drawing/2017/decorative" val="1"/>
+                <adec:decorative xmlns:adec="http://schemas.microsoft.com/office/drawing/2017/decorative" xmlns="" val="1"/>
               </a:ext>
             </a:extLst>
           </p:cNvPr>
@@ -5069,7 +5487,7 @@
           <p:nvPr>
             <p:extLst>
               <p:ext uri="{386F3935-93C4-4BCD-93E2-E3B085C9AB24}">
-                <p16:designElem xmlns:p16="http://schemas.microsoft.com/office/powerpoint/2015/main" val="1"/>
+                <p16:designElem xmlns:p16="http://schemas.microsoft.com/office/powerpoint/2015/main" xmlns="" val="1"/>
               </p:ext>
             </p:extLst>
           </p:nvPr>
@@ -5116,7 +5534,7 @@
           <p:cNvPr id="2" name="Titre 1">
             <a:extLst>
               <a:ext uri="{FF2B5EF4-FFF2-40B4-BE49-F238E27FC236}">
-                <a16:creationId xmlns:a16="http://schemas.microsoft.com/office/drawing/2014/main" id="{11E9F62F-C54F-46BF-AAD7-5996504CC594}"/>
+                <a16:creationId xmlns:a16="http://schemas.microsoft.com/office/drawing/2014/main" xmlns="" id="{11E9F62F-C54F-46BF-AAD7-5996504CC594}"/>
               </a:ext>
             </a:extLst>
           </p:cNvPr>
@@ -5172,6 +5590,96 @@
           </a:p>
         </p:txBody>
       </p:sp>
+      <p:pic>
+        <p:nvPicPr>
+          <p:cNvPr id="6" name="Image 5">
+            <a:extLst>
+              <a:ext uri="{FF2B5EF4-FFF2-40B4-BE49-F238E27FC236}">
+                <a16:creationId xmlns:a16="http://schemas.microsoft.com/office/drawing/2014/main" xmlns="" id="{2599AFEE-C634-4243-AE13-F6C87F125960}"/>
+              </a:ext>
+            </a:extLst>
+          </p:cNvPr>
+          <p:cNvPicPr>
+            <a:picLocks noChangeAspect="1"/>
+          </p:cNvPicPr>
+          <p:nvPr/>
+        </p:nvPicPr>
+        <p:blipFill>
+          <a:blip r:embed="rId2"/>
+          <a:stretch>
+            <a:fillRect/>
+          </a:stretch>
+        </p:blipFill>
+        <p:spPr>
+          <a:xfrm>
+            <a:off x="6148387" y="2295525"/>
+            <a:ext cx="5629275" cy="4219575"/>
+          </a:xfrm>
+          <a:prstGeom prst="rect">
+            <a:avLst/>
+          </a:prstGeom>
+        </p:spPr>
+      </p:pic>
+      <p:pic>
+        <p:nvPicPr>
+          <p:cNvPr id="7" name="Image 6">
+            <a:extLst>
+              <a:ext uri="{FF2B5EF4-FFF2-40B4-BE49-F238E27FC236}">
+                <a16:creationId xmlns:a16="http://schemas.microsoft.com/office/drawing/2014/main" xmlns="" id="{53208F83-5978-453E-9A17-8A42E0E8B8D3}"/>
+              </a:ext>
+            </a:extLst>
+          </p:cNvPr>
+          <p:cNvPicPr>
+            <a:picLocks noChangeAspect="1"/>
+          </p:cNvPicPr>
+          <p:nvPr/>
+        </p:nvPicPr>
+        <p:blipFill>
+          <a:blip r:embed="rId3"/>
+          <a:stretch>
+            <a:fillRect/>
+          </a:stretch>
+        </p:blipFill>
+        <p:spPr>
+          <a:xfrm>
+            <a:off x="3450431" y="2438400"/>
+            <a:ext cx="6972300" cy="3733800"/>
+          </a:xfrm>
+          <a:prstGeom prst="rect">
+            <a:avLst/>
+          </a:prstGeom>
+        </p:spPr>
+      </p:pic>
+      <p:pic>
+        <p:nvPicPr>
+          <p:cNvPr id="8" name="Image 7">
+            <a:extLst>
+              <a:ext uri="{FF2B5EF4-FFF2-40B4-BE49-F238E27FC236}">
+                <a16:creationId xmlns:a16="http://schemas.microsoft.com/office/drawing/2014/main" xmlns="" id="{79291A25-0532-4DD6-9090-30E2A5D6A951}"/>
+              </a:ext>
+            </a:extLst>
+          </p:cNvPr>
+          <p:cNvPicPr>
+            <a:picLocks noChangeAspect="1"/>
+          </p:cNvPicPr>
+          <p:nvPr/>
+        </p:nvPicPr>
+        <p:blipFill>
+          <a:blip r:embed="rId4"/>
+          <a:stretch>
+            <a:fillRect/>
+          </a:stretch>
+        </p:blipFill>
+        <p:spPr>
+          <a:xfrm>
+            <a:off x="2662237" y="1600200"/>
+            <a:ext cx="6867525" cy="3657600"/>
+          </a:xfrm>
+          <a:prstGeom prst="rect">
+            <a:avLst/>
+          </a:prstGeom>
+        </p:spPr>
+      </p:pic>
     </p:spTree>
     <p:extLst>
       <p:ext uri="{BB962C8B-B14F-4D97-AF65-F5344CB8AC3E}">
@@ -5215,10 +5723,10 @@
           <p:cNvPr id="9" name="Rectangle 8">
             <a:extLst>
               <a:ext uri="{FF2B5EF4-FFF2-40B4-BE49-F238E27FC236}">
-                <a16:creationId xmlns:a16="http://schemas.microsoft.com/office/drawing/2014/main" id="{B3E5064B-BAF4-48C7-8C2C-8219FF24A7A4}"/>
+                <a16:creationId xmlns:a16="http://schemas.microsoft.com/office/drawing/2014/main" xmlns="" id="{B3E5064B-BAF4-48C7-8C2C-8219FF24A7A4}"/>
               </a:ext>
               <a:ext uri="{C183D7F6-B498-43B3-948B-1728B52AA6E4}">
-                <adec:decorative xmlns:adec="http://schemas.microsoft.com/office/drawing/2017/decorative" val="1"/>
+                <adec:decorative xmlns:adec="http://schemas.microsoft.com/office/drawing/2017/decorative" xmlns="" val="1"/>
               </a:ext>
             </a:extLst>
           </p:cNvPr>
@@ -5228,7 +5736,7 @@
           <p:nvPr>
             <p:extLst>
               <p:ext uri="{386F3935-93C4-4BCD-93E2-E3B085C9AB24}">
-                <p16:designElem xmlns:p16="http://schemas.microsoft.com/office/powerpoint/2015/main" val="1"/>
+                <p16:designElem xmlns:p16="http://schemas.microsoft.com/office/powerpoint/2015/main" xmlns="" val="1"/>
               </p:ext>
             </p:extLst>
           </p:nvPr>
@@ -5291,10 +5799,10 @@
           <p:cNvPr id="11" name="Rectangle 10">
             <a:extLst>
               <a:ext uri="{FF2B5EF4-FFF2-40B4-BE49-F238E27FC236}">
-                <a16:creationId xmlns:a16="http://schemas.microsoft.com/office/drawing/2014/main" id="{8A7C3535-4FB5-4E5B-BDFE-FA61877AF1A9}"/>
+                <a16:creationId xmlns:a16="http://schemas.microsoft.com/office/drawing/2014/main" xmlns="" id="{8A7C3535-4FB5-4E5B-BDFE-FA61877AF1A9}"/>
               </a:ext>
               <a:ext uri="{C183D7F6-B498-43B3-948B-1728B52AA6E4}">
-                <adec:decorative xmlns:adec="http://schemas.microsoft.com/office/drawing/2017/decorative" val="1"/>
+                <adec:decorative xmlns:adec="http://schemas.microsoft.com/office/drawing/2017/decorative" xmlns="" val="1"/>
               </a:ext>
             </a:extLst>
           </p:cNvPr>
@@ -5304,7 +5812,7 @@
           <p:nvPr>
             <p:extLst>
               <p:ext uri="{386F3935-93C4-4BCD-93E2-E3B085C9AB24}">
-                <p16:designElem xmlns:p16="http://schemas.microsoft.com/office/powerpoint/2015/main" val="1"/>
+                <p16:designElem xmlns:p16="http://schemas.microsoft.com/office/powerpoint/2015/main" xmlns="" val="1"/>
               </p:ext>
             </p:extLst>
           </p:nvPr>
@@ -5358,10 +5866,10 @@
           <p:cNvPr id="13" name="Rectangle 12">
             <a:extLst>
               <a:ext uri="{FF2B5EF4-FFF2-40B4-BE49-F238E27FC236}">
-                <a16:creationId xmlns:a16="http://schemas.microsoft.com/office/drawing/2014/main" id="{23E33EB3-397E-4C5F-B561-7FEE7C781FB7}"/>
+                <a16:creationId xmlns:a16="http://schemas.microsoft.com/office/drawing/2014/main" xmlns="" id="{23E33EB3-397E-4C5F-B561-7FEE7C781FB7}"/>
               </a:ext>
               <a:ext uri="{C183D7F6-B498-43B3-948B-1728B52AA6E4}">
-                <adec:decorative xmlns:adec="http://schemas.microsoft.com/office/drawing/2017/decorative" val="1"/>
+                <adec:decorative xmlns:adec="http://schemas.microsoft.com/office/drawing/2017/decorative" xmlns="" val="1"/>
               </a:ext>
             </a:extLst>
           </p:cNvPr>
@@ -5371,7 +5879,7 @@
           <p:nvPr>
             <p:extLst>
               <p:ext uri="{386F3935-93C4-4BCD-93E2-E3B085C9AB24}">
-                <p16:designElem xmlns:p16="http://schemas.microsoft.com/office/powerpoint/2015/main" val="1"/>
+                <p16:designElem xmlns:p16="http://schemas.microsoft.com/office/powerpoint/2015/main" xmlns="" val="1"/>
               </p:ext>
             </p:extLst>
           </p:nvPr>
@@ -5418,7 +5926,7 @@
           <p:cNvPr id="2" name="Titre 1">
             <a:extLst>
               <a:ext uri="{FF2B5EF4-FFF2-40B4-BE49-F238E27FC236}">
-                <a16:creationId xmlns:a16="http://schemas.microsoft.com/office/drawing/2014/main" id="{E128A163-BB85-4FB3-846E-65BDEFE133CD}"/>
+                <a16:creationId xmlns:a16="http://schemas.microsoft.com/office/drawing/2014/main" xmlns="" id="{E128A163-BB85-4FB3-846E-65BDEFE133CD}"/>
               </a:ext>
             </a:extLst>
           </p:cNvPr>
@@ -5467,7 +5975,7 @@
           <p:cNvPr id="3" name="Espace réservé du contenu 2">
             <a:extLst>
               <a:ext uri="{FF2B5EF4-FFF2-40B4-BE49-F238E27FC236}">
-                <a16:creationId xmlns:a16="http://schemas.microsoft.com/office/drawing/2014/main" id="{282E4563-F67D-4F3A-BB9E-119106A20742}"/>
+                <a16:creationId xmlns:a16="http://schemas.microsoft.com/office/drawing/2014/main" xmlns="" id="{282E4563-F67D-4F3A-BB9E-119106A20742}"/>
               </a:ext>
             </a:extLst>
           </p:cNvPr>
@@ -5695,7 +6203,7 @@
           <p:cNvPr id="4" name="Image 3">
             <a:extLst>
               <a:ext uri="{FF2B5EF4-FFF2-40B4-BE49-F238E27FC236}">
-                <a16:creationId xmlns:a16="http://schemas.microsoft.com/office/drawing/2014/main" id="{528DB325-A04E-BB49-9061-1E27D33F8169}"/>
+                <a16:creationId xmlns:a16="http://schemas.microsoft.com/office/drawing/2014/main" xmlns="" id="{528DB325-A04E-BB49-9061-1E27D33F8169}"/>
               </a:ext>
             </a:extLst>
           </p:cNvPr>
@@ -5725,7 +6233,7 @@
           <p:cNvPr id="10" name="ZoneTexte 9">
             <a:extLst>
               <a:ext uri="{FF2B5EF4-FFF2-40B4-BE49-F238E27FC236}">
-                <a16:creationId xmlns:a16="http://schemas.microsoft.com/office/drawing/2014/main" id="{B6F5874D-2381-4DB0-99C1-442A2C91CD91}"/>
+                <a16:creationId xmlns:a16="http://schemas.microsoft.com/office/drawing/2014/main" xmlns="" id="{B6F5874D-2381-4DB0-99C1-442A2C91CD91}"/>
               </a:ext>
             </a:extLst>
           </p:cNvPr>
@@ -5799,10 +6307,10 @@
           <p:cNvPr id="12" name="Rectangle 11">
             <a:extLst>
               <a:ext uri="{FF2B5EF4-FFF2-40B4-BE49-F238E27FC236}">
-                <a16:creationId xmlns:a16="http://schemas.microsoft.com/office/drawing/2014/main" id="{B3E5064B-BAF4-48C7-8C2C-8219FF24A7A4}"/>
+                <a16:creationId xmlns:a16="http://schemas.microsoft.com/office/drawing/2014/main" xmlns="" id="{B3E5064B-BAF4-48C7-8C2C-8219FF24A7A4}"/>
               </a:ext>
               <a:ext uri="{C183D7F6-B498-43B3-948B-1728B52AA6E4}">
-                <adec:decorative xmlns:adec="http://schemas.microsoft.com/office/drawing/2017/decorative" val="1"/>
+                <adec:decorative xmlns:adec="http://schemas.microsoft.com/office/drawing/2017/decorative" xmlns="" val="1"/>
               </a:ext>
             </a:extLst>
           </p:cNvPr>
@@ -5812,7 +6320,7 @@
           <p:nvPr>
             <p:extLst>
               <p:ext uri="{386F3935-93C4-4BCD-93E2-E3B085C9AB24}">
-                <p16:designElem xmlns:p16="http://schemas.microsoft.com/office/powerpoint/2015/main" val="1"/>
+                <p16:designElem xmlns:p16="http://schemas.microsoft.com/office/powerpoint/2015/main" xmlns="" val="1"/>
               </p:ext>
             </p:extLst>
           </p:nvPr>
@@ -5875,10 +6383,10 @@
           <p:cNvPr id="14" name="Rectangle 13">
             <a:extLst>
               <a:ext uri="{FF2B5EF4-FFF2-40B4-BE49-F238E27FC236}">
-                <a16:creationId xmlns:a16="http://schemas.microsoft.com/office/drawing/2014/main" id="{8A7C3535-4FB5-4E5B-BDFE-FA61877AF1A9}"/>
+                <a16:creationId xmlns:a16="http://schemas.microsoft.com/office/drawing/2014/main" xmlns="" id="{8A7C3535-4FB5-4E5B-BDFE-FA61877AF1A9}"/>
               </a:ext>
               <a:ext uri="{C183D7F6-B498-43B3-948B-1728B52AA6E4}">
-                <adec:decorative xmlns:adec="http://schemas.microsoft.com/office/drawing/2017/decorative" val="1"/>
+                <adec:decorative xmlns:adec="http://schemas.microsoft.com/office/drawing/2017/decorative" xmlns="" val="1"/>
               </a:ext>
             </a:extLst>
           </p:cNvPr>
@@ -5888,7 +6396,7 @@
           <p:nvPr>
             <p:extLst>
               <p:ext uri="{386F3935-93C4-4BCD-93E2-E3B085C9AB24}">
-                <p16:designElem xmlns:p16="http://schemas.microsoft.com/office/powerpoint/2015/main" val="1"/>
+                <p16:designElem xmlns:p16="http://schemas.microsoft.com/office/powerpoint/2015/main" xmlns="" val="1"/>
               </p:ext>
             </p:extLst>
           </p:nvPr>
@@ -5942,10 +6450,10 @@
           <p:cNvPr id="16" name="Rectangle 15">
             <a:extLst>
               <a:ext uri="{FF2B5EF4-FFF2-40B4-BE49-F238E27FC236}">
-                <a16:creationId xmlns:a16="http://schemas.microsoft.com/office/drawing/2014/main" id="{23E33EB3-397E-4C5F-B561-7FEE7C781FB7}"/>
+                <a16:creationId xmlns:a16="http://schemas.microsoft.com/office/drawing/2014/main" xmlns="" id="{23E33EB3-397E-4C5F-B561-7FEE7C781FB7}"/>
               </a:ext>
               <a:ext uri="{C183D7F6-B498-43B3-948B-1728B52AA6E4}">
-                <adec:decorative xmlns:adec="http://schemas.microsoft.com/office/drawing/2017/decorative" val="1"/>
+                <adec:decorative xmlns:adec="http://schemas.microsoft.com/office/drawing/2017/decorative" xmlns="" val="1"/>
               </a:ext>
             </a:extLst>
           </p:cNvPr>
@@ -5955,7 +6463,7 @@
           <p:nvPr>
             <p:extLst>
               <p:ext uri="{386F3935-93C4-4BCD-93E2-E3B085C9AB24}">
-                <p16:designElem xmlns:p16="http://schemas.microsoft.com/office/powerpoint/2015/main" val="1"/>
+                <p16:designElem xmlns:p16="http://schemas.microsoft.com/office/powerpoint/2015/main" xmlns="" val="1"/>
               </p:ext>
             </p:extLst>
           </p:nvPr>
@@ -6002,7 +6510,7 @@
           <p:cNvPr id="2" name="Titre 1">
             <a:extLst>
               <a:ext uri="{FF2B5EF4-FFF2-40B4-BE49-F238E27FC236}">
-                <a16:creationId xmlns:a16="http://schemas.microsoft.com/office/drawing/2014/main" id="{11E9F62F-C54F-46BF-AAD7-5996504CC594}"/>
+                <a16:creationId xmlns:a16="http://schemas.microsoft.com/office/drawing/2014/main" xmlns="" id="{11E9F62F-C54F-46BF-AAD7-5996504CC594}"/>
               </a:ext>
             </a:extLst>
           </p:cNvPr>
@@ -6042,7 +6550,7 @@
           <p:cNvPr id="3" name="Espace réservé du contenu 2">
             <a:extLst>
               <a:ext uri="{FF2B5EF4-FFF2-40B4-BE49-F238E27FC236}">
-                <a16:creationId xmlns:a16="http://schemas.microsoft.com/office/drawing/2014/main" id="{3FFBE9BB-7F49-40EC-A85F-00D0A670C058}"/>
+                <a16:creationId xmlns:a16="http://schemas.microsoft.com/office/drawing/2014/main" xmlns="" id="{3FFBE9BB-7F49-40EC-A85F-00D0A670C058}"/>
               </a:ext>
             </a:extLst>
           </p:cNvPr>
@@ -6218,7 +6726,7 @@
           <p:cNvPr id="7" name="Image 6">
             <a:extLst>
               <a:ext uri="{FF2B5EF4-FFF2-40B4-BE49-F238E27FC236}">
-                <a16:creationId xmlns:a16="http://schemas.microsoft.com/office/drawing/2014/main" id="{6D2AB11D-6ACE-4EF8-98CF-01CFB65D6135}"/>
+                <a16:creationId xmlns:a16="http://schemas.microsoft.com/office/drawing/2014/main" xmlns="" id="{6D2AB11D-6ACE-4EF8-98CF-01CFB65D6135}"/>
               </a:ext>
             </a:extLst>
           </p:cNvPr>
@@ -6292,10 +6800,10 @@
           <p:cNvPr id="12" name="Rectangle 11">
             <a:extLst>
               <a:ext uri="{FF2B5EF4-FFF2-40B4-BE49-F238E27FC236}">
-                <a16:creationId xmlns:a16="http://schemas.microsoft.com/office/drawing/2014/main" id="{B3E5064B-BAF4-48C7-8C2C-8219FF24A7A4}"/>
+                <a16:creationId xmlns:a16="http://schemas.microsoft.com/office/drawing/2014/main" xmlns="" id="{B3E5064B-BAF4-48C7-8C2C-8219FF24A7A4}"/>
               </a:ext>
               <a:ext uri="{C183D7F6-B498-43B3-948B-1728B52AA6E4}">
-                <adec:decorative xmlns:adec="http://schemas.microsoft.com/office/drawing/2017/decorative" val="1"/>
+                <adec:decorative xmlns:adec="http://schemas.microsoft.com/office/drawing/2017/decorative" xmlns="" val="1"/>
               </a:ext>
             </a:extLst>
           </p:cNvPr>
@@ -6305,7 +6813,7 @@
           <p:nvPr>
             <p:extLst>
               <p:ext uri="{386F3935-93C4-4BCD-93E2-E3B085C9AB24}">
-                <p16:designElem xmlns:p16="http://schemas.microsoft.com/office/powerpoint/2015/main" val="1"/>
+                <p16:designElem xmlns:p16="http://schemas.microsoft.com/office/powerpoint/2015/main" xmlns="" val="1"/>
               </p:ext>
             </p:extLst>
           </p:nvPr>
@@ -6368,10 +6876,10 @@
           <p:cNvPr id="14" name="Rectangle 13">
             <a:extLst>
               <a:ext uri="{FF2B5EF4-FFF2-40B4-BE49-F238E27FC236}">
-                <a16:creationId xmlns:a16="http://schemas.microsoft.com/office/drawing/2014/main" id="{8A7C3535-4FB5-4E5B-BDFE-FA61877AF1A9}"/>
+                <a16:creationId xmlns:a16="http://schemas.microsoft.com/office/drawing/2014/main" xmlns="" id="{8A7C3535-4FB5-4E5B-BDFE-FA61877AF1A9}"/>
               </a:ext>
               <a:ext uri="{C183D7F6-B498-43B3-948B-1728B52AA6E4}">
-                <adec:decorative xmlns:adec="http://schemas.microsoft.com/office/drawing/2017/decorative" val="1"/>
+                <adec:decorative xmlns:adec="http://schemas.microsoft.com/office/drawing/2017/decorative" xmlns="" val="1"/>
               </a:ext>
             </a:extLst>
           </p:cNvPr>
@@ -6381,7 +6889,7 @@
           <p:nvPr>
             <p:extLst>
               <p:ext uri="{386F3935-93C4-4BCD-93E2-E3B085C9AB24}">
-                <p16:designElem xmlns:p16="http://schemas.microsoft.com/office/powerpoint/2015/main" val="1"/>
+                <p16:designElem xmlns:p16="http://schemas.microsoft.com/office/powerpoint/2015/main" xmlns="" val="1"/>
               </p:ext>
             </p:extLst>
           </p:nvPr>
@@ -6435,10 +6943,10 @@
           <p:cNvPr id="16" name="Rectangle 15">
             <a:extLst>
               <a:ext uri="{FF2B5EF4-FFF2-40B4-BE49-F238E27FC236}">
-                <a16:creationId xmlns:a16="http://schemas.microsoft.com/office/drawing/2014/main" id="{23E33EB3-397E-4C5F-B561-7FEE7C781FB7}"/>
+                <a16:creationId xmlns:a16="http://schemas.microsoft.com/office/drawing/2014/main" xmlns="" id="{23E33EB3-397E-4C5F-B561-7FEE7C781FB7}"/>
               </a:ext>
               <a:ext uri="{C183D7F6-B498-43B3-948B-1728B52AA6E4}">
-                <adec:decorative xmlns:adec="http://schemas.microsoft.com/office/drawing/2017/decorative" val="1"/>
+                <adec:decorative xmlns:adec="http://schemas.microsoft.com/office/drawing/2017/decorative" xmlns="" val="1"/>
               </a:ext>
             </a:extLst>
           </p:cNvPr>
@@ -6448,7 +6956,7 @@
           <p:nvPr>
             <p:extLst>
               <p:ext uri="{386F3935-93C4-4BCD-93E2-E3B085C9AB24}">
-                <p16:designElem xmlns:p16="http://schemas.microsoft.com/office/powerpoint/2015/main" val="1"/>
+                <p16:designElem xmlns:p16="http://schemas.microsoft.com/office/powerpoint/2015/main" xmlns="" val="1"/>
               </p:ext>
             </p:extLst>
           </p:nvPr>
@@ -6495,7 +7003,7 @@
           <p:cNvPr id="2" name="Titre 1">
             <a:extLst>
               <a:ext uri="{FF2B5EF4-FFF2-40B4-BE49-F238E27FC236}">
-                <a16:creationId xmlns:a16="http://schemas.microsoft.com/office/drawing/2014/main" id="{11E9F62F-C54F-46BF-AAD7-5996504CC594}"/>
+                <a16:creationId xmlns:a16="http://schemas.microsoft.com/office/drawing/2014/main" xmlns="" id="{11E9F62F-C54F-46BF-AAD7-5996504CC594}"/>
               </a:ext>
             </a:extLst>
           </p:cNvPr>
@@ -6530,7 +7038,7 @@
           <p:cNvPr id="3" name="Espace réservé du contenu 2">
             <a:extLst>
               <a:ext uri="{FF2B5EF4-FFF2-40B4-BE49-F238E27FC236}">
-                <a16:creationId xmlns:a16="http://schemas.microsoft.com/office/drawing/2014/main" id="{3FFBE9BB-7F49-40EC-A85F-00D0A670C058}"/>
+                <a16:creationId xmlns:a16="http://schemas.microsoft.com/office/drawing/2014/main" xmlns="" id="{3FFBE9BB-7F49-40EC-A85F-00D0A670C058}"/>
               </a:ext>
             </a:extLst>
           </p:cNvPr>
@@ -6631,7 +7139,7 @@
           <p:cNvPr id="5" name="Image 4">
             <a:extLst>
               <a:ext uri="{FF2B5EF4-FFF2-40B4-BE49-F238E27FC236}">
-                <a16:creationId xmlns:a16="http://schemas.microsoft.com/office/drawing/2014/main" id="{F3C3F9B7-6E07-48D5-8E0A-ED5E181AA22C}"/>
+                <a16:creationId xmlns:a16="http://schemas.microsoft.com/office/drawing/2014/main" xmlns="" id="{F3C3F9B7-6E07-48D5-8E0A-ED5E181AA22C}"/>
               </a:ext>
             </a:extLst>
           </p:cNvPr>
@@ -6661,7 +7169,7 @@
           <p:cNvPr id="8" name="Image 7">
             <a:extLst>
               <a:ext uri="{FF2B5EF4-FFF2-40B4-BE49-F238E27FC236}">
-                <a16:creationId xmlns:a16="http://schemas.microsoft.com/office/drawing/2014/main" id="{1C0EA24B-F033-4683-85DD-06B7104F5DE7}"/>
+                <a16:creationId xmlns:a16="http://schemas.microsoft.com/office/drawing/2014/main" xmlns="" id="{1C0EA24B-F033-4683-85DD-06B7104F5DE7}"/>
               </a:ext>
             </a:extLst>
           </p:cNvPr>
@@ -6729,10 +7237,10 @@
           <p:cNvPr id="12" name="Rectangle 11">
             <a:extLst>
               <a:ext uri="{FF2B5EF4-FFF2-40B4-BE49-F238E27FC236}">
-                <a16:creationId xmlns:a16="http://schemas.microsoft.com/office/drawing/2014/main" id="{B3E5064B-BAF4-48C7-8C2C-8219FF24A7A4}"/>
+                <a16:creationId xmlns:a16="http://schemas.microsoft.com/office/drawing/2014/main" xmlns="" id="{B3E5064B-BAF4-48C7-8C2C-8219FF24A7A4}"/>
               </a:ext>
               <a:ext uri="{C183D7F6-B498-43B3-948B-1728B52AA6E4}">
-                <adec:decorative xmlns:adec="http://schemas.microsoft.com/office/drawing/2017/decorative" val="1"/>
+                <adec:decorative xmlns:adec="http://schemas.microsoft.com/office/drawing/2017/decorative" xmlns="" val="1"/>
               </a:ext>
             </a:extLst>
           </p:cNvPr>
@@ -6742,7 +7250,7 @@
           <p:nvPr>
             <p:extLst>
               <p:ext uri="{386F3935-93C4-4BCD-93E2-E3B085C9AB24}">
-                <p16:designElem xmlns:p16="http://schemas.microsoft.com/office/powerpoint/2015/main" val="1"/>
+                <p16:designElem xmlns:p16="http://schemas.microsoft.com/office/powerpoint/2015/main" xmlns="" val="1"/>
               </p:ext>
             </p:extLst>
           </p:nvPr>
@@ -6805,10 +7313,10 @@
           <p:cNvPr id="14" name="Rectangle 13">
             <a:extLst>
               <a:ext uri="{FF2B5EF4-FFF2-40B4-BE49-F238E27FC236}">
-                <a16:creationId xmlns:a16="http://schemas.microsoft.com/office/drawing/2014/main" id="{8A7C3535-4FB5-4E5B-BDFE-FA61877AF1A9}"/>
+                <a16:creationId xmlns:a16="http://schemas.microsoft.com/office/drawing/2014/main" xmlns="" id="{8A7C3535-4FB5-4E5B-BDFE-FA61877AF1A9}"/>
               </a:ext>
               <a:ext uri="{C183D7F6-B498-43B3-948B-1728B52AA6E4}">
-                <adec:decorative xmlns:adec="http://schemas.microsoft.com/office/drawing/2017/decorative" val="1"/>
+                <adec:decorative xmlns:adec="http://schemas.microsoft.com/office/drawing/2017/decorative" xmlns="" val="1"/>
               </a:ext>
             </a:extLst>
           </p:cNvPr>
@@ -6818,7 +7326,7 @@
           <p:nvPr>
             <p:extLst>
               <p:ext uri="{386F3935-93C4-4BCD-93E2-E3B085C9AB24}">
-                <p16:designElem xmlns:p16="http://schemas.microsoft.com/office/powerpoint/2015/main" val="1"/>
+                <p16:designElem xmlns:p16="http://schemas.microsoft.com/office/powerpoint/2015/main" xmlns="" val="1"/>
               </p:ext>
             </p:extLst>
           </p:nvPr>
@@ -6872,10 +7380,10 @@
           <p:cNvPr id="16" name="Rectangle 15">
             <a:extLst>
               <a:ext uri="{FF2B5EF4-FFF2-40B4-BE49-F238E27FC236}">
-                <a16:creationId xmlns:a16="http://schemas.microsoft.com/office/drawing/2014/main" id="{23E33EB3-397E-4C5F-B561-7FEE7C781FB7}"/>
+                <a16:creationId xmlns:a16="http://schemas.microsoft.com/office/drawing/2014/main" xmlns="" id="{23E33EB3-397E-4C5F-B561-7FEE7C781FB7}"/>
               </a:ext>
               <a:ext uri="{C183D7F6-B498-43B3-948B-1728B52AA6E4}">
-                <adec:decorative xmlns:adec="http://schemas.microsoft.com/office/drawing/2017/decorative" val="1"/>
+                <adec:decorative xmlns:adec="http://schemas.microsoft.com/office/drawing/2017/decorative" xmlns="" val="1"/>
               </a:ext>
             </a:extLst>
           </p:cNvPr>
@@ -6885,7 +7393,7 @@
           <p:nvPr>
             <p:extLst>
               <p:ext uri="{386F3935-93C4-4BCD-93E2-E3B085C9AB24}">
-                <p16:designElem xmlns:p16="http://schemas.microsoft.com/office/powerpoint/2015/main" val="1"/>
+                <p16:designElem xmlns:p16="http://schemas.microsoft.com/office/powerpoint/2015/main" xmlns="" val="1"/>
               </p:ext>
             </p:extLst>
           </p:nvPr>
@@ -6932,7 +7440,7 @@
           <p:cNvPr id="2" name="Titre 1">
             <a:extLst>
               <a:ext uri="{FF2B5EF4-FFF2-40B4-BE49-F238E27FC236}">
-                <a16:creationId xmlns:a16="http://schemas.microsoft.com/office/drawing/2014/main" id="{11E9F62F-C54F-46BF-AAD7-5996504CC594}"/>
+                <a16:creationId xmlns:a16="http://schemas.microsoft.com/office/drawing/2014/main" xmlns="" id="{11E9F62F-C54F-46BF-AAD7-5996504CC594}"/>
               </a:ext>
             </a:extLst>
           </p:cNvPr>
@@ -6972,7 +7480,7 @@
           <p:cNvPr id="3" name="Espace réservé du contenu 2">
             <a:extLst>
               <a:ext uri="{FF2B5EF4-FFF2-40B4-BE49-F238E27FC236}">
-                <a16:creationId xmlns:a16="http://schemas.microsoft.com/office/drawing/2014/main" id="{3FFBE9BB-7F49-40EC-A85F-00D0A670C058}"/>
+                <a16:creationId xmlns:a16="http://schemas.microsoft.com/office/drawing/2014/main" xmlns="" id="{3FFBE9BB-7F49-40EC-A85F-00D0A670C058}"/>
               </a:ext>
             </a:extLst>
           </p:cNvPr>
@@ -7203,7 +7711,7 @@
           <p:cNvPr id="13" name="ZoneTexte 12">
             <a:extLst>
               <a:ext uri="{FF2B5EF4-FFF2-40B4-BE49-F238E27FC236}">
-                <a16:creationId xmlns:a16="http://schemas.microsoft.com/office/drawing/2014/main" id="{FE94B486-5AE4-49C0-8392-6D7800B66FE9}"/>
+                <a16:creationId xmlns:a16="http://schemas.microsoft.com/office/drawing/2014/main" xmlns="" id="{FE94B486-5AE4-49C0-8392-6D7800B66FE9}"/>
               </a:ext>
             </a:extLst>
           </p:cNvPr>
@@ -7546,7 +8054,7 @@
           <p:cNvPr id="17" name="Image 16">
             <a:extLst>
               <a:ext uri="{FF2B5EF4-FFF2-40B4-BE49-F238E27FC236}">
-                <a16:creationId xmlns:a16="http://schemas.microsoft.com/office/drawing/2014/main" id="{0448FFAD-BB3F-4D4E-BD40-32CF8C9A1EF7}"/>
+                <a16:creationId xmlns:a16="http://schemas.microsoft.com/office/drawing/2014/main" xmlns="" id="{0448FFAD-BB3F-4D4E-BD40-32CF8C9A1EF7}"/>
               </a:ext>
             </a:extLst>
           </p:cNvPr>
@@ -7576,7 +8084,7 @@
           <p:cNvPr id="19" name="Image 18">
             <a:extLst>
               <a:ext uri="{FF2B5EF4-FFF2-40B4-BE49-F238E27FC236}">
-                <a16:creationId xmlns:a16="http://schemas.microsoft.com/office/drawing/2014/main" id="{414C4C14-E5D7-46D7-A6EC-CAE7A85BC5DB}"/>
+                <a16:creationId xmlns:a16="http://schemas.microsoft.com/office/drawing/2014/main" xmlns="" id="{414C4C14-E5D7-46D7-A6EC-CAE7A85BC5DB}"/>
               </a:ext>
             </a:extLst>
           </p:cNvPr>
@@ -7643,10 +8151,10 @@
           <p:cNvPr id="21" name="Rectangle 20">
             <a:extLst>
               <a:ext uri="{FF2B5EF4-FFF2-40B4-BE49-F238E27FC236}">
-                <a16:creationId xmlns:a16="http://schemas.microsoft.com/office/drawing/2014/main" id="{B3E5064B-BAF4-48C7-8C2C-8219FF24A7A4}"/>
+                <a16:creationId xmlns:a16="http://schemas.microsoft.com/office/drawing/2014/main" xmlns="" id="{B3E5064B-BAF4-48C7-8C2C-8219FF24A7A4}"/>
               </a:ext>
               <a:ext uri="{C183D7F6-B498-43B3-948B-1728B52AA6E4}">
-                <adec:decorative xmlns:adec="http://schemas.microsoft.com/office/drawing/2017/decorative" val="1"/>
+                <adec:decorative xmlns:adec="http://schemas.microsoft.com/office/drawing/2017/decorative" xmlns="" val="1"/>
               </a:ext>
             </a:extLst>
           </p:cNvPr>
@@ -7656,7 +8164,7 @@
           <p:nvPr>
             <p:extLst>
               <p:ext uri="{386F3935-93C4-4BCD-93E2-E3B085C9AB24}">
-                <p16:designElem xmlns:p16="http://schemas.microsoft.com/office/powerpoint/2015/main" val="1"/>
+                <p16:designElem xmlns:p16="http://schemas.microsoft.com/office/powerpoint/2015/main" xmlns="" val="1"/>
               </p:ext>
             </p:extLst>
           </p:nvPr>
@@ -7719,10 +8227,10 @@
           <p:cNvPr id="23" name="Rectangle 22">
             <a:extLst>
               <a:ext uri="{FF2B5EF4-FFF2-40B4-BE49-F238E27FC236}">
-                <a16:creationId xmlns:a16="http://schemas.microsoft.com/office/drawing/2014/main" id="{8A7C3535-4FB5-4E5B-BDFE-FA61877AF1A9}"/>
+                <a16:creationId xmlns:a16="http://schemas.microsoft.com/office/drawing/2014/main" xmlns="" id="{8A7C3535-4FB5-4E5B-BDFE-FA61877AF1A9}"/>
               </a:ext>
               <a:ext uri="{C183D7F6-B498-43B3-948B-1728B52AA6E4}">
-                <adec:decorative xmlns:adec="http://schemas.microsoft.com/office/drawing/2017/decorative" val="1"/>
+                <adec:decorative xmlns:adec="http://schemas.microsoft.com/office/drawing/2017/decorative" xmlns="" val="1"/>
               </a:ext>
             </a:extLst>
           </p:cNvPr>
@@ -7732,7 +8240,7 @@
           <p:nvPr>
             <p:extLst>
               <p:ext uri="{386F3935-93C4-4BCD-93E2-E3B085C9AB24}">
-                <p16:designElem xmlns:p16="http://schemas.microsoft.com/office/powerpoint/2015/main" val="1"/>
+                <p16:designElem xmlns:p16="http://schemas.microsoft.com/office/powerpoint/2015/main" xmlns="" val="1"/>
               </p:ext>
             </p:extLst>
           </p:nvPr>
@@ -7786,10 +8294,10 @@
           <p:cNvPr id="25" name="Rectangle 24">
             <a:extLst>
               <a:ext uri="{FF2B5EF4-FFF2-40B4-BE49-F238E27FC236}">
-                <a16:creationId xmlns:a16="http://schemas.microsoft.com/office/drawing/2014/main" id="{23E33EB3-397E-4C5F-B561-7FEE7C781FB7}"/>
+                <a16:creationId xmlns:a16="http://schemas.microsoft.com/office/drawing/2014/main" xmlns="" id="{23E33EB3-397E-4C5F-B561-7FEE7C781FB7}"/>
               </a:ext>
               <a:ext uri="{C183D7F6-B498-43B3-948B-1728B52AA6E4}">
-                <adec:decorative xmlns:adec="http://schemas.microsoft.com/office/drawing/2017/decorative" val="1"/>
+                <adec:decorative xmlns:adec="http://schemas.microsoft.com/office/drawing/2017/decorative" xmlns="" val="1"/>
               </a:ext>
             </a:extLst>
           </p:cNvPr>
@@ -7799,7 +8307,7 @@
           <p:nvPr>
             <p:extLst>
               <p:ext uri="{386F3935-93C4-4BCD-93E2-E3B085C9AB24}">
-                <p16:designElem xmlns:p16="http://schemas.microsoft.com/office/powerpoint/2015/main" val="1"/>
+                <p16:designElem xmlns:p16="http://schemas.microsoft.com/office/powerpoint/2015/main" xmlns="" val="1"/>
               </p:ext>
             </p:extLst>
           </p:nvPr>
@@ -7846,7 +8354,7 @@
           <p:cNvPr id="2" name="Titre 1">
             <a:extLst>
               <a:ext uri="{FF2B5EF4-FFF2-40B4-BE49-F238E27FC236}">
-                <a16:creationId xmlns:a16="http://schemas.microsoft.com/office/drawing/2014/main" id="{11E9F62F-C54F-46BF-AAD7-5996504CC594}"/>
+                <a16:creationId xmlns:a16="http://schemas.microsoft.com/office/drawing/2014/main" xmlns="" id="{11E9F62F-C54F-46BF-AAD7-5996504CC594}"/>
               </a:ext>
             </a:extLst>
           </p:cNvPr>
@@ -7886,7 +8394,7 @@
           <p:cNvPr id="3" name="Espace réservé du contenu 2">
             <a:extLst>
               <a:ext uri="{FF2B5EF4-FFF2-40B4-BE49-F238E27FC236}">
-                <a16:creationId xmlns:a16="http://schemas.microsoft.com/office/drawing/2014/main" id="{3FFBE9BB-7F49-40EC-A85F-00D0A670C058}"/>
+                <a16:creationId xmlns:a16="http://schemas.microsoft.com/office/drawing/2014/main" xmlns="" id="{3FFBE9BB-7F49-40EC-A85F-00D0A670C058}"/>
               </a:ext>
             </a:extLst>
           </p:cNvPr>
@@ -7944,7 +8452,7 @@
           <p:cNvPr id="5" name="Image 4">
             <a:extLst>
               <a:ext uri="{FF2B5EF4-FFF2-40B4-BE49-F238E27FC236}">
-                <a16:creationId xmlns:a16="http://schemas.microsoft.com/office/drawing/2014/main" id="{E9C27467-61CA-451E-8B62-E7BD655A0178}"/>
+                <a16:creationId xmlns:a16="http://schemas.microsoft.com/office/drawing/2014/main" xmlns="" id="{E9C27467-61CA-451E-8B62-E7BD655A0178}"/>
               </a:ext>
             </a:extLst>
           </p:cNvPr>
@@ -8012,10 +8520,10 @@
           <p:cNvPr id="21" name="Rectangle 20">
             <a:extLst>
               <a:ext uri="{FF2B5EF4-FFF2-40B4-BE49-F238E27FC236}">
-                <a16:creationId xmlns:a16="http://schemas.microsoft.com/office/drawing/2014/main" id="{B3E5064B-BAF4-48C7-8C2C-8219FF24A7A4}"/>
+                <a16:creationId xmlns:a16="http://schemas.microsoft.com/office/drawing/2014/main" xmlns="" id="{B3E5064B-BAF4-48C7-8C2C-8219FF24A7A4}"/>
               </a:ext>
               <a:ext uri="{C183D7F6-B498-43B3-948B-1728B52AA6E4}">
-                <adec:decorative xmlns:adec="http://schemas.microsoft.com/office/drawing/2017/decorative" val="1"/>
+                <adec:decorative xmlns:adec="http://schemas.microsoft.com/office/drawing/2017/decorative" xmlns="" val="1"/>
               </a:ext>
             </a:extLst>
           </p:cNvPr>
@@ -8025,7 +8533,7 @@
           <p:nvPr>
             <p:extLst>
               <p:ext uri="{386F3935-93C4-4BCD-93E2-E3B085C9AB24}">
-                <p16:designElem xmlns:p16="http://schemas.microsoft.com/office/powerpoint/2015/main" val="1"/>
+                <p16:designElem xmlns:p16="http://schemas.microsoft.com/office/powerpoint/2015/main" xmlns="" val="1"/>
               </p:ext>
             </p:extLst>
           </p:nvPr>
@@ -8088,10 +8596,10 @@
           <p:cNvPr id="23" name="Rectangle 22">
             <a:extLst>
               <a:ext uri="{FF2B5EF4-FFF2-40B4-BE49-F238E27FC236}">
-                <a16:creationId xmlns:a16="http://schemas.microsoft.com/office/drawing/2014/main" id="{8A7C3535-4FB5-4E5B-BDFE-FA61877AF1A9}"/>
+                <a16:creationId xmlns:a16="http://schemas.microsoft.com/office/drawing/2014/main" xmlns="" id="{8A7C3535-4FB5-4E5B-BDFE-FA61877AF1A9}"/>
               </a:ext>
               <a:ext uri="{C183D7F6-B498-43B3-948B-1728B52AA6E4}">
-                <adec:decorative xmlns:adec="http://schemas.microsoft.com/office/drawing/2017/decorative" val="1"/>
+                <adec:decorative xmlns:adec="http://schemas.microsoft.com/office/drawing/2017/decorative" xmlns="" val="1"/>
               </a:ext>
             </a:extLst>
           </p:cNvPr>
@@ -8101,7 +8609,7 @@
           <p:nvPr>
             <p:extLst>
               <p:ext uri="{386F3935-93C4-4BCD-93E2-E3B085C9AB24}">
-                <p16:designElem xmlns:p16="http://schemas.microsoft.com/office/powerpoint/2015/main" val="1"/>
+                <p16:designElem xmlns:p16="http://schemas.microsoft.com/office/powerpoint/2015/main" xmlns="" val="1"/>
               </p:ext>
             </p:extLst>
           </p:nvPr>
@@ -8155,10 +8663,10 @@
           <p:cNvPr id="25" name="Rectangle 24">
             <a:extLst>
               <a:ext uri="{FF2B5EF4-FFF2-40B4-BE49-F238E27FC236}">
-                <a16:creationId xmlns:a16="http://schemas.microsoft.com/office/drawing/2014/main" id="{23E33EB3-397E-4C5F-B561-7FEE7C781FB7}"/>
+                <a16:creationId xmlns:a16="http://schemas.microsoft.com/office/drawing/2014/main" xmlns="" id="{23E33EB3-397E-4C5F-B561-7FEE7C781FB7}"/>
               </a:ext>
               <a:ext uri="{C183D7F6-B498-43B3-948B-1728B52AA6E4}">
-                <adec:decorative xmlns:adec="http://schemas.microsoft.com/office/drawing/2017/decorative" val="1"/>
+                <adec:decorative xmlns:adec="http://schemas.microsoft.com/office/drawing/2017/decorative" xmlns="" val="1"/>
               </a:ext>
             </a:extLst>
           </p:cNvPr>
@@ -8168,7 +8676,7 @@
           <p:nvPr>
             <p:extLst>
               <p:ext uri="{386F3935-93C4-4BCD-93E2-E3B085C9AB24}">
-                <p16:designElem xmlns:p16="http://schemas.microsoft.com/office/powerpoint/2015/main" val="1"/>
+                <p16:designElem xmlns:p16="http://schemas.microsoft.com/office/powerpoint/2015/main" xmlns="" val="1"/>
               </p:ext>
             </p:extLst>
           </p:nvPr>
@@ -8215,7 +8723,7 @@
           <p:cNvPr id="2" name="Titre 1">
             <a:extLst>
               <a:ext uri="{FF2B5EF4-FFF2-40B4-BE49-F238E27FC236}">
-                <a16:creationId xmlns:a16="http://schemas.microsoft.com/office/drawing/2014/main" id="{11E9F62F-C54F-46BF-AAD7-5996504CC594}"/>
+                <a16:creationId xmlns:a16="http://schemas.microsoft.com/office/drawing/2014/main" xmlns="" id="{11E9F62F-C54F-46BF-AAD7-5996504CC594}"/>
               </a:ext>
             </a:extLst>
           </p:cNvPr>
@@ -8255,7 +8763,7 @@
           <p:cNvPr id="3" name="Espace réservé du contenu 2">
             <a:extLst>
               <a:ext uri="{FF2B5EF4-FFF2-40B4-BE49-F238E27FC236}">
-                <a16:creationId xmlns:a16="http://schemas.microsoft.com/office/drawing/2014/main" id="{3FFBE9BB-7F49-40EC-A85F-00D0A670C058}"/>
+                <a16:creationId xmlns:a16="http://schemas.microsoft.com/office/drawing/2014/main" xmlns="" id="{3FFBE9BB-7F49-40EC-A85F-00D0A670C058}"/>
               </a:ext>
             </a:extLst>
           </p:cNvPr>
@@ -8372,7 +8880,7 @@
           <p:cNvPr id="6" name="Image 5">
             <a:extLst>
               <a:ext uri="{FF2B5EF4-FFF2-40B4-BE49-F238E27FC236}">
-                <a16:creationId xmlns:a16="http://schemas.microsoft.com/office/drawing/2014/main" id="{984AEA27-A463-4A9E-806F-1D3A01BFEC81}"/>
+                <a16:creationId xmlns:a16="http://schemas.microsoft.com/office/drawing/2014/main" xmlns="" id="{984AEA27-A463-4A9E-806F-1D3A01BFEC81}"/>
               </a:ext>
             </a:extLst>
           </p:cNvPr>
@@ -8402,7 +8910,7 @@
           <p:cNvPr id="8" name="Image 7">
             <a:extLst>
               <a:ext uri="{FF2B5EF4-FFF2-40B4-BE49-F238E27FC236}">
-                <a16:creationId xmlns:a16="http://schemas.microsoft.com/office/drawing/2014/main" id="{6199502D-C740-410C-B33A-A5CD719E59B9}"/>
+                <a16:creationId xmlns:a16="http://schemas.microsoft.com/office/drawing/2014/main" xmlns="" id="{6199502D-C740-410C-B33A-A5CD719E59B9}"/>
               </a:ext>
             </a:extLst>
           </p:cNvPr>
@@ -8432,7 +8940,7 @@
           <p:cNvPr id="10" name="Image 9">
             <a:extLst>
               <a:ext uri="{FF2B5EF4-FFF2-40B4-BE49-F238E27FC236}">
-                <a16:creationId xmlns:a16="http://schemas.microsoft.com/office/drawing/2014/main" id="{A8642CAB-8C93-42F6-BD5E-291976FA4EC3}"/>
+                <a16:creationId xmlns:a16="http://schemas.microsoft.com/office/drawing/2014/main" xmlns="" id="{A8642CAB-8C93-42F6-BD5E-291976FA4EC3}"/>
               </a:ext>
             </a:extLst>
           </p:cNvPr>
@@ -8500,10 +9008,10 @@
           <p:cNvPr id="21" name="Rectangle 20">
             <a:extLst>
               <a:ext uri="{FF2B5EF4-FFF2-40B4-BE49-F238E27FC236}">
-                <a16:creationId xmlns:a16="http://schemas.microsoft.com/office/drawing/2014/main" id="{B3E5064B-BAF4-48C7-8C2C-8219FF24A7A4}"/>
+                <a16:creationId xmlns:a16="http://schemas.microsoft.com/office/drawing/2014/main" xmlns="" id="{B3E5064B-BAF4-48C7-8C2C-8219FF24A7A4}"/>
               </a:ext>
               <a:ext uri="{C183D7F6-B498-43B3-948B-1728B52AA6E4}">
-                <adec:decorative xmlns:adec="http://schemas.microsoft.com/office/drawing/2017/decorative" val="1"/>
+                <adec:decorative xmlns:adec="http://schemas.microsoft.com/office/drawing/2017/decorative" xmlns="" val="1"/>
               </a:ext>
             </a:extLst>
           </p:cNvPr>
@@ -8513,7 +9021,7 @@
           <p:nvPr>
             <p:extLst>
               <p:ext uri="{386F3935-93C4-4BCD-93E2-E3B085C9AB24}">
-                <p16:designElem xmlns:p16="http://schemas.microsoft.com/office/powerpoint/2015/main" val="1"/>
+                <p16:designElem xmlns:p16="http://schemas.microsoft.com/office/powerpoint/2015/main" xmlns="" val="1"/>
               </p:ext>
             </p:extLst>
           </p:nvPr>
@@ -8576,10 +9084,10 @@
           <p:cNvPr id="23" name="Rectangle 22">
             <a:extLst>
               <a:ext uri="{FF2B5EF4-FFF2-40B4-BE49-F238E27FC236}">
-                <a16:creationId xmlns:a16="http://schemas.microsoft.com/office/drawing/2014/main" id="{8A7C3535-4FB5-4E5B-BDFE-FA61877AF1A9}"/>
+                <a16:creationId xmlns:a16="http://schemas.microsoft.com/office/drawing/2014/main" xmlns="" id="{8A7C3535-4FB5-4E5B-BDFE-FA61877AF1A9}"/>
               </a:ext>
               <a:ext uri="{C183D7F6-B498-43B3-948B-1728B52AA6E4}">
-                <adec:decorative xmlns:adec="http://schemas.microsoft.com/office/drawing/2017/decorative" val="1"/>
+                <adec:decorative xmlns:adec="http://schemas.microsoft.com/office/drawing/2017/decorative" xmlns="" val="1"/>
               </a:ext>
             </a:extLst>
           </p:cNvPr>
@@ -8589,7 +9097,7 @@
           <p:nvPr>
             <p:extLst>
               <p:ext uri="{386F3935-93C4-4BCD-93E2-E3B085C9AB24}">
-                <p16:designElem xmlns:p16="http://schemas.microsoft.com/office/powerpoint/2015/main" val="1"/>
+                <p16:designElem xmlns:p16="http://schemas.microsoft.com/office/powerpoint/2015/main" xmlns="" val="1"/>
               </p:ext>
             </p:extLst>
           </p:nvPr>
@@ -8643,10 +9151,10 @@
           <p:cNvPr id="25" name="Rectangle 24">
             <a:extLst>
               <a:ext uri="{FF2B5EF4-FFF2-40B4-BE49-F238E27FC236}">
-                <a16:creationId xmlns:a16="http://schemas.microsoft.com/office/drawing/2014/main" id="{23E33EB3-397E-4C5F-B561-7FEE7C781FB7}"/>
+                <a16:creationId xmlns:a16="http://schemas.microsoft.com/office/drawing/2014/main" xmlns="" id="{23E33EB3-397E-4C5F-B561-7FEE7C781FB7}"/>
               </a:ext>
               <a:ext uri="{C183D7F6-B498-43B3-948B-1728B52AA6E4}">
-                <adec:decorative xmlns:adec="http://schemas.microsoft.com/office/drawing/2017/decorative" val="1"/>
+                <adec:decorative xmlns:adec="http://schemas.microsoft.com/office/drawing/2017/decorative" xmlns="" val="1"/>
               </a:ext>
             </a:extLst>
           </p:cNvPr>
@@ -8656,7 +9164,7 @@
           <p:nvPr>
             <p:extLst>
               <p:ext uri="{386F3935-93C4-4BCD-93E2-E3B085C9AB24}">
-                <p16:designElem xmlns:p16="http://schemas.microsoft.com/office/powerpoint/2015/main" val="1"/>
+                <p16:designElem xmlns:p16="http://schemas.microsoft.com/office/powerpoint/2015/main" xmlns="" val="1"/>
               </p:ext>
             </p:extLst>
           </p:nvPr>
@@ -8703,7 +9211,7 @@
           <p:cNvPr id="2" name="Titre 1">
             <a:extLst>
               <a:ext uri="{FF2B5EF4-FFF2-40B4-BE49-F238E27FC236}">
-                <a16:creationId xmlns:a16="http://schemas.microsoft.com/office/drawing/2014/main" id="{11E9F62F-C54F-46BF-AAD7-5996504CC594}"/>
+                <a16:creationId xmlns:a16="http://schemas.microsoft.com/office/drawing/2014/main" xmlns="" id="{11E9F62F-C54F-46BF-AAD7-5996504CC594}"/>
               </a:ext>
             </a:extLst>
           </p:cNvPr>
@@ -8743,7 +9251,7 @@
           <p:cNvPr id="3" name="Espace réservé du contenu 2">
             <a:extLst>
               <a:ext uri="{FF2B5EF4-FFF2-40B4-BE49-F238E27FC236}">
-                <a16:creationId xmlns:a16="http://schemas.microsoft.com/office/drawing/2014/main" id="{3FFBE9BB-7F49-40EC-A85F-00D0A670C058}"/>
+                <a16:creationId xmlns:a16="http://schemas.microsoft.com/office/drawing/2014/main" xmlns="" id="{3FFBE9BB-7F49-40EC-A85F-00D0A670C058}"/>
               </a:ext>
             </a:extLst>
           </p:cNvPr>
@@ -8874,7 +9382,7 @@
           <p:cNvPr id="5" name="Image 4">
             <a:extLst>
               <a:ext uri="{FF2B5EF4-FFF2-40B4-BE49-F238E27FC236}">
-                <a16:creationId xmlns:a16="http://schemas.microsoft.com/office/drawing/2014/main" id="{B10BCAF9-6BEA-48F6-9823-2D5055B6F42F}"/>
+                <a16:creationId xmlns:a16="http://schemas.microsoft.com/office/drawing/2014/main" xmlns="" id="{B10BCAF9-6BEA-48F6-9823-2D5055B6F42F}"/>
               </a:ext>
             </a:extLst>
           </p:cNvPr>
@@ -8904,7 +9412,7 @@
           <p:cNvPr id="9" name="Image 8">
             <a:extLst>
               <a:ext uri="{FF2B5EF4-FFF2-40B4-BE49-F238E27FC236}">
-                <a16:creationId xmlns:a16="http://schemas.microsoft.com/office/drawing/2014/main" id="{ECECBBAA-B2E1-4BBB-A361-5497E297B97E}"/>
+                <a16:creationId xmlns:a16="http://schemas.microsoft.com/office/drawing/2014/main" xmlns="" id="{ECECBBAA-B2E1-4BBB-A361-5497E297B97E}"/>
               </a:ext>
             </a:extLst>
           </p:cNvPr>
@@ -8934,7 +9442,7 @@
           <p:cNvPr id="12" name="Image 11">
             <a:extLst>
               <a:ext uri="{FF2B5EF4-FFF2-40B4-BE49-F238E27FC236}">
-                <a16:creationId xmlns:a16="http://schemas.microsoft.com/office/drawing/2014/main" id="{13A25DF9-9ADF-4FE5-BC90-546672A0C8DE}"/>
+                <a16:creationId xmlns:a16="http://schemas.microsoft.com/office/drawing/2014/main" xmlns="" id="{13A25DF9-9ADF-4FE5-BC90-546672A0C8DE}"/>
               </a:ext>
             </a:extLst>
           </p:cNvPr>
@@ -9002,10 +9510,10 @@
           <p:cNvPr id="30" name="Rectangle 29">
             <a:extLst>
               <a:ext uri="{FF2B5EF4-FFF2-40B4-BE49-F238E27FC236}">
-                <a16:creationId xmlns:a16="http://schemas.microsoft.com/office/drawing/2014/main" id="{B3E5064B-BAF4-48C7-8C2C-8219FF24A7A4}"/>
+                <a16:creationId xmlns:a16="http://schemas.microsoft.com/office/drawing/2014/main" xmlns="" id="{B3E5064B-BAF4-48C7-8C2C-8219FF24A7A4}"/>
               </a:ext>
               <a:ext uri="{C183D7F6-B498-43B3-948B-1728B52AA6E4}">
-                <adec:decorative xmlns:adec="http://schemas.microsoft.com/office/drawing/2017/decorative" val="1"/>
+                <adec:decorative xmlns:adec="http://schemas.microsoft.com/office/drawing/2017/decorative" xmlns="" val="1"/>
               </a:ext>
             </a:extLst>
           </p:cNvPr>
@@ -9015,7 +9523,7 @@
           <p:nvPr>
             <p:extLst>
               <p:ext uri="{386F3935-93C4-4BCD-93E2-E3B085C9AB24}">
-                <p16:designElem xmlns:p16="http://schemas.microsoft.com/office/powerpoint/2015/main" val="1"/>
+                <p16:designElem xmlns:p16="http://schemas.microsoft.com/office/powerpoint/2015/main" xmlns="" val="1"/>
               </p:ext>
             </p:extLst>
           </p:nvPr>
@@ -9078,10 +9586,10 @@
           <p:cNvPr id="32" name="Rectangle 31">
             <a:extLst>
               <a:ext uri="{FF2B5EF4-FFF2-40B4-BE49-F238E27FC236}">
-                <a16:creationId xmlns:a16="http://schemas.microsoft.com/office/drawing/2014/main" id="{8A7C3535-4FB5-4E5B-BDFE-FA61877AF1A9}"/>
+                <a16:creationId xmlns:a16="http://schemas.microsoft.com/office/drawing/2014/main" xmlns="" id="{8A7C3535-4FB5-4E5B-BDFE-FA61877AF1A9}"/>
               </a:ext>
               <a:ext uri="{C183D7F6-B498-43B3-948B-1728B52AA6E4}">
-                <adec:decorative xmlns:adec="http://schemas.microsoft.com/office/drawing/2017/decorative" val="1"/>
+                <adec:decorative xmlns:adec="http://schemas.microsoft.com/office/drawing/2017/decorative" xmlns="" val="1"/>
               </a:ext>
             </a:extLst>
           </p:cNvPr>
@@ -9091,7 +9599,7 @@
           <p:nvPr>
             <p:extLst>
               <p:ext uri="{386F3935-93C4-4BCD-93E2-E3B085C9AB24}">
-                <p16:designElem xmlns:p16="http://schemas.microsoft.com/office/powerpoint/2015/main" val="1"/>
+                <p16:designElem xmlns:p16="http://schemas.microsoft.com/office/powerpoint/2015/main" xmlns="" val="1"/>
               </p:ext>
             </p:extLst>
           </p:nvPr>
@@ -9145,10 +9653,10 @@
           <p:cNvPr id="34" name="Rectangle 33">
             <a:extLst>
               <a:ext uri="{FF2B5EF4-FFF2-40B4-BE49-F238E27FC236}">
-                <a16:creationId xmlns:a16="http://schemas.microsoft.com/office/drawing/2014/main" id="{23E33EB3-397E-4C5F-B561-7FEE7C781FB7}"/>
+                <a16:creationId xmlns:a16="http://schemas.microsoft.com/office/drawing/2014/main" xmlns="" id="{23E33EB3-397E-4C5F-B561-7FEE7C781FB7}"/>
               </a:ext>
               <a:ext uri="{C183D7F6-B498-43B3-948B-1728B52AA6E4}">
-                <adec:decorative xmlns:adec="http://schemas.microsoft.com/office/drawing/2017/decorative" val="1"/>
+                <adec:decorative xmlns:adec="http://schemas.microsoft.com/office/drawing/2017/decorative" xmlns="" val="1"/>
               </a:ext>
             </a:extLst>
           </p:cNvPr>
@@ -9158,7 +9666,7 @@
           <p:nvPr>
             <p:extLst>
               <p:ext uri="{386F3935-93C4-4BCD-93E2-E3B085C9AB24}">
-                <p16:designElem xmlns:p16="http://schemas.microsoft.com/office/powerpoint/2015/main" val="1"/>
+                <p16:designElem xmlns:p16="http://schemas.microsoft.com/office/powerpoint/2015/main" xmlns="" val="1"/>
               </p:ext>
             </p:extLst>
           </p:nvPr>
@@ -9205,7 +9713,7 @@
           <p:cNvPr id="2" name="Titre 1">
             <a:extLst>
               <a:ext uri="{FF2B5EF4-FFF2-40B4-BE49-F238E27FC236}">
-                <a16:creationId xmlns:a16="http://schemas.microsoft.com/office/drawing/2014/main" id="{11E9F62F-C54F-46BF-AAD7-5996504CC594}"/>
+                <a16:creationId xmlns:a16="http://schemas.microsoft.com/office/drawing/2014/main" xmlns="" id="{11E9F62F-C54F-46BF-AAD7-5996504CC594}"/>
               </a:ext>
             </a:extLst>
           </p:cNvPr>
@@ -9242,7 +9750,7 @@
           <p:cNvPr id="3" name="Espace réservé du contenu 2">
             <a:extLst>
               <a:ext uri="{FF2B5EF4-FFF2-40B4-BE49-F238E27FC236}">
-                <a16:creationId xmlns:a16="http://schemas.microsoft.com/office/drawing/2014/main" id="{3FFBE9BB-7F49-40EC-A85F-00D0A670C058}"/>
+                <a16:creationId xmlns:a16="http://schemas.microsoft.com/office/drawing/2014/main" xmlns="" id="{3FFBE9BB-7F49-40EC-A85F-00D0A670C058}"/>
               </a:ext>
             </a:extLst>
           </p:cNvPr>
@@ -9261,7 +9769,7 @@
         </p:spPr>
         <p:txBody>
           <a:bodyPr>
-            <a:normAutofit/>
+            <a:normAutofit fontScale="92500"/>
           </a:bodyPr>
           <a:lstStyle/>
           <a:p>
@@ -9355,7 +9863,7 @@
           <p:cNvPr id="13" name="Image 12">
             <a:extLst>
               <a:ext uri="{FF2B5EF4-FFF2-40B4-BE49-F238E27FC236}">
-                <a16:creationId xmlns:a16="http://schemas.microsoft.com/office/drawing/2014/main" id="{380AC06F-BEB7-3B43-81B7-76B6E276B541}"/>
+                <a16:creationId xmlns:a16="http://schemas.microsoft.com/office/drawing/2014/main" xmlns="" id="{380AC06F-BEB7-3B43-81B7-76B6E276B541}"/>
               </a:ext>
             </a:extLst>
           </p:cNvPr>

</xml_diff>